<commit_message>
First round of edits
</commit_message>
<xml_diff>
--- a/03 - Patterns of Software Architecture.pptx
+++ b/03 - Patterns of Software Architecture.pptx
@@ -5,35 +5,36 @@
     <p:sldMasterId id="2147483660" r:id="rId1"/>
   </p:sldMasterIdLst>
   <p:notesMasterIdLst>
-    <p:notesMasterId r:id="rId28"/>
+    <p:notesMasterId r:id="rId29"/>
   </p:notesMasterIdLst>
   <p:sldIdLst>
     <p:sldId id="256" r:id="rId2"/>
     <p:sldId id="257" r:id="rId3"/>
     <p:sldId id="266" r:id="rId4"/>
-    <p:sldId id="285" r:id="rId5"/>
-    <p:sldId id="287" r:id="rId6"/>
-    <p:sldId id="288" r:id="rId7"/>
-    <p:sldId id="260" r:id="rId8"/>
-    <p:sldId id="261" r:id="rId9"/>
-    <p:sldId id="289" r:id="rId10"/>
-    <p:sldId id="263" r:id="rId11"/>
-    <p:sldId id="262" r:id="rId12"/>
-    <p:sldId id="264" r:id="rId13"/>
-    <p:sldId id="265" r:id="rId14"/>
-    <p:sldId id="290" r:id="rId15"/>
-    <p:sldId id="292" r:id="rId16"/>
-    <p:sldId id="258" r:id="rId17"/>
-    <p:sldId id="291" r:id="rId18"/>
-    <p:sldId id="293" r:id="rId19"/>
-    <p:sldId id="294" r:id="rId20"/>
-    <p:sldId id="298" r:id="rId21"/>
-    <p:sldId id="299" r:id="rId22"/>
-    <p:sldId id="300" r:id="rId23"/>
-    <p:sldId id="301" r:id="rId24"/>
-    <p:sldId id="267" r:id="rId25"/>
-    <p:sldId id="296" r:id="rId26"/>
-    <p:sldId id="295" r:id="rId27"/>
+    <p:sldId id="302" r:id="rId5"/>
+    <p:sldId id="285" r:id="rId6"/>
+    <p:sldId id="287" r:id="rId7"/>
+    <p:sldId id="288" r:id="rId8"/>
+    <p:sldId id="260" r:id="rId9"/>
+    <p:sldId id="261" r:id="rId10"/>
+    <p:sldId id="289" r:id="rId11"/>
+    <p:sldId id="263" r:id="rId12"/>
+    <p:sldId id="262" r:id="rId13"/>
+    <p:sldId id="264" r:id="rId14"/>
+    <p:sldId id="265" r:id="rId15"/>
+    <p:sldId id="290" r:id="rId16"/>
+    <p:sldId id="292" r:id="rId17"/>
+    <p:sldId id="258" r:id="rId18"/>
+    <p:sldId id="291" r:id="rId19"/>
+    <p:sldId id="293" r:id="rId20"/>
+    <p:sldId id="294" r:id="rId21"/>
+    <p:sldId id="298" r:id="rId22"/>
+    <p:sldId id="299" r:id="rId23"/>
+    <p:sldId id="300" r:id="rId24"/>
+    <p:sldId id="301" r:id="rId25"/>
+    <p:sldId id="267" r:id="rId26"/>
+    <p:sldId id="296" r:id="rId27"/>
+    <p:sldId id="295" r:id="rId28"/>
   </p:sldIdLst>
   <p:sldSz cx="9144000" cy="6858000" type="screen4x3"/>
   <p:notesSz cx="6858000" cy="9144000"/>
@@ -559,7 +560,7 @@
           <a:p>
             <a:fld id="{E58294B0-43FA-4697-A94A-C7D8A3CEE26B}" type="slidenum">
               <a:rPr lang="en-US" smtClean="0"/>
-              <a:t>4</a:t>
+              <a:t>5</a:t>
             </a:fld>
             <a:endParaRPr lang="en-US"/>
           </a:p>
@@ -685,7 +686,7 @@
           <a:p>
             <a:fld id="{6DC91497-A9F3-1C44-8CE7-F09D083DBC37}" type="slidenum">
               <a:rPr lang="en-US" smtClean="0"/>
-              <a:t>23</a:t>
+              <a:t>24</a:t>
             </a:fld>
             <a:endParaRPr lang="en-US"/>
           </a:p>
@@ -3664,6 +3665,92 @@
       </p:grpSpPr>
       <p:sp>
         <p:nvSpPr>
+          <p:cNvPr id="4" name="Title 3">
+            <a:extLst>
+              <a:ext uri="{FF2B5EF4-FFF2-40B4-BE49-F238E27FC236}">
+                <a16:creationId xmlns:a16="http://schemas.microsoft.com/office/drawing/2014/main" id="{03FE6122-EFC2-C942-B268-DA20C7759D8B}"/>
+              </a:ext>
+            </a:extLst>
+          </p:cNvPr>
+          <p:cNvSpPr>
+            <a:spLocks noGrp="1"/>
+          </p:cNvSpPr>
+          <p:nvPr>
+            <p:ph type="title"/>
+          </p:nvPr>
+        </p:nvSpPr>
+        <p:spPr/>
+        <p:txBody>
+          <a:bodyPr/>
+          <a:lstStyle/>
+          <a:p>
+            <a:r>
+              <a:rPr lang="en-US" dirty="0"/>
+              <a:t>Architecture</a:t>
+            </a:r>
+          </a:p>
+        </p:txBody>
+      </p:sp>
+      <p:sp>
+        <p:nvSpPr>
+          <p:cNvPr id="5" name="Text Placeholder 4">
+            <a:extLst>
+              <a:ext uri="{FF2B5EF4-FFF2-40B4-BE49-F238E27FC236}">
+                <a16:creationId xmlns:a16="http://schemas.microsoft.com/office/drawing/2014/main" id="{B4FD8A11-A0F8-7740-8455-15717C062A0D}"/>
+              </a:ext>
+            </a:extLst>
+          </p:cNvPr>
+          <p:cNvSpPr>
+            <a:spLocks noGrp="1"/>
+          </p:cNvSpPr>
+          <p:nvPr>
+            <p:ph type="body" idx="1"/>
+          </p:nvPr>
+        </p:nvSpPr>
+        <p:spPr/>
+        <p:txBody>
+          <a:bodyPr/>
+          <a:lstStyle/>
+          <a:p>
+            <a:r>
+              <a:rPr lang="en-US" dirty="0"/>
+              <a:t>The 60,000 foot view</a:t>
+            </a:r>
+          </a:p>
+        </p:txBody>
+      </p:sp>
+    </p:spTree>
+    <p:extLst>
+      <p:ext uri="{BB962C8B-B14F-4D97-AF65-F5344CB8AC3E}">
+        <p14:creationId xmlns:p14="http://schemas.microsoft.com/office/powerpoint/2010/main" val="4197220091"/>
+      </p:ext>
+    </p:extLst>
+  </p:cSld>
+  <p:clrMapOvr>
+    <a:masterClrMapping/>
+  </p:clrMapOvr>
+</p:sld>
+</file>
+
+<file path=ppt/slides/slide11.xml><?xml version="1.0" encoding="utf-8"?>
+<p:sld xmlns:a="http://schemas.openxmlformats.org/drawingml/2006/main" xmlns:r="http://schemas.openxmlformats.org/officeDocument/2006/relationships" xmlns:p="http://schemas.openxmlformats.org/presentationml/2006/main">
+  <p:cSld>
+    <p:spTree>
+      <p:nvGrpSpPr>
+        <p:cNvPr id="1" name=""/>
+        <p:cNvGrpSpPr/>
+        <p:nvPr/>
+      </p:nvGrpSpPr>
+      <p:grpSpPr>
+        <a:xfrm>
+          <a:off x="0" y="0"/>
+          <a:ext cx="0" cy="0"/>
+          <a:chOff x="0" y="0"/>
+          <a:chExt cx="0" cy="0"/>
+        </a:xfrm>
+      </p:grpSpPr>
+      <p:sp>
+        <p:nvSpPr>
           <p:cNvPr id="2" name="Title 1">
             <a:extLst>
               <a:ext uri="{FF2B5EF4-FFF2-40B4-BE49-F238E27FC236}">
@@ -3749,7 +3836,7 @@
             </a:r>
             <a:r>
               <a:rPr lang="en-US" sz="2000" dirty="0"/>
-              <a:t>. the arrangement of AWS resources is architecture, but how the EC2 instances process business objects is not</a:t>
+              <a:t>. the arrangement of AWS resources is architecture, but how the code processes business objects is not</a:t>
             </a:r>
           </a:p>
         </p:txBody>
@@ -3920,163 +4007,6 @@
 </p:sld>
 </file>
 
-<file path=ppt/slides/slide11.xml><?xml version="1.0" encoding="utf-8"?>
-<p:sld xmlns:a="http://schemas.openxmlformats.org/drawingml/2006/main" xmlns:r="http://schemas.openxmlformats.org/officeDocument/2006/relationships" xmlns:p="http://schemas.openxmlformats.org/presentationml/2006/main">
-  <p:cSld>
-    <p:spTree>
-      <p:nvGrpSpPr>
-        <p:cNvPr id="1" name=""/>
-        <p:cNvGrpSpPr/>
-        <p:nvPr/>
-      </p:nvGrpSpPr>
-      <p:grpSpPr>
-        <a:xfrm>
-          <a:off x="0" y="0"/>
-          <a:ext cx="0" cy="0"/>
-          <a:chOff x="0" y="0"/>
-          <a:chExt cx="0" cy="0"/>
-        </a:xfrm>
-      </p:grpSpPr>
-      <p:sp>
-        <p:nvSpPr>
-          <p:cNvPr id="2" name="Title 1">
-            <a:extLst>
-              <a:ext uri="{FF2B5EF4-FFF2-40B4-BE49-F238E27FC236}">
-                <a16:creationId xmlns:a16="http://schemas.microsoft.com/office/drawing/2014/main" id="{4974A172-A87D-F14B-BB15-A8536564844B}"/>
-              </a:ext>
-            </a:extLst>
-          </p:cNvPr>
-          <p:cNvSpPr>
-            <a:spLocks noGrp="1"/>
-          </p:cNvSpPr>
-          <p:nvPr>
-            <p:ph type="title"/>
-          </p:nvPr>
-        </p:nvSpPr>
-        <p:spPr/>
-        <p:txBody>
-          <a:bodyPr/>
-          <a:lstStyle/>
-          <a:p>
-            <a:r>
-              <a:rPr lang="en-US" dirty="0"/>
-              <a:t>Levels of patterns – architectural patterns</a:t>
-            </a:r>
-          </a:p>
-        </p:txBody>
-      </p:sp>
-      <p:sp>
-        <p:nvSpPr>
-          <p:cNvPr id="3" name="Content Placeholder 2">
-            <a:extLst>
-              <a:ext uri="{FF2B5EF4-FFF2-40B4-BE49-F238E27FC236}">
-                <a16:creationId xmlns:a16="http://schemas.microsoft.com/office/drawing/2014/main" id="{DA6B4C44-373A-524F-B8B1-3494285ED793}"/>
-              </a:ext>
-            </a:extLst>
-          </p:cNvPr>
-          <p:cNvSpPr>
-            <a:spLocks noGrp="1"/>
-          </p:cNvSpPr>
-          <p:nvPr>
-            <p:ph idx="1"/>
-          </p:nvPr>
-        </p:nvSpPr>
-        <p:spPr/>
-        <p:txBody>
-          <a:bodyPr/>
-          <a:lstStyle/>
-          <a:p>
-            <a:r>
-              <a:rPr lang="en-US" dirty="0"/>
-              <a:t>a general, reusable solution to a commonly occurring problem within a given context in software design</a:t>
-            </a:r>
-          </a:p>
-          <a:p>
-            <a:endParaRPr lang="en-US" dirty="0"/>
-          </a:p>
-          <a:p>
-            <a:r>
-              <a:rPr lang="en-US" dirty="0"/>
-              <a:t>address various issues in software engineering, such as computer hardware performance limitations, high availability, and minimization of a business risk</a:t>
-            </a:r>
-          </a:p>
-        </p:txBody>
-      </p:sp>
-      <p:sp>
-        <p:nvSpPr>
-          <p:cNvPr id="5" name="TextBox 4">
-            <a:extLst>
-              <a:ext uri="{FF2B5EF4-FFF2-40B4-BE49-F238E27FC236}">
-                <a16:creationId xmlns:a16="http://schemas.microsoft.com/office/drawing/2014/main" id="{83C2C066-9014-724C-B20D-68198BA70AB3}"/>
-              </a:ext>
-            </a:extLst>
-          </p:cNvPr>
-          <p:cNvSpPr txBox="1"/>
-          <p:nvPr/>
-        </p:nvSpPr>
-        <p:spPr>
-          <a:xfrm>
-            <a:off x="2263923" y="5923047"/>
-            <a:ext cx="6502806" cy="507831"/>
-          </a:xfrm>
-          <a:prstGeom prst="rect">
-            <a:avLst/>
-          </a:prstGeom>
-          <a:solidFill>
-            <a:schemeClr val="bg1">
-              <a:lumMod val="95000"/>
-            </a:schemeClr>
-          </a:solidFill>
-        </p:spPr>
-        <p:txBody>
-          <a:bodyPr wrap="none" rtlCol="0">
-            <a:spAutoFit/>
-          </a:bodyPr>
-          <a:lstStyle/>
-          <a:p>
-            <a:r>
-              <a:rPr lang="en-US" sz="1350" b="1" dirty="0">
-                <a:latin typeface="Calibri" panose="020F0502020204030204" pitchFamily="34" charset="0"/>
-                <a:cs typeface="Calibri" panose="020F0502020204030204" pitchFamily="34" charset="0"/>
-              </a:rPr>
-              <a:t>Pipes and filters</a:t>
-            </a:r>
-            <a:r>
-              <a:rPr lang="en-US" sz="1350" dirty="0">
-                <a:latin typeface="Calibri" panose="020F0502020204030204" pitchFamily="34" charset="0"/>
-                <a:cs typeface="Calibri" panose="020F0502020204030204" pitchFamily="34" charset="0"/>
-              </a:rPr>
-              <a:t>: a pipeline consisting of a chain of processing elements, arranged so that </a:t>
-            </a:r>
-            <a:br>
-              <a:rPr lang="en-US" sz="1350" dirty="0">
-                <a:latin typeface="Calibri" panose="020F0502020204030204" pitchFamily="34" charset="0"/>
-                <a:cs typeface="Calibri" panose="020F0502020204030204" pitchFamily="34" charset="0"/>
-              </a:rPr>
-            </a:br>
-            <a:r>
-              <a:rPr lang="en-US" sz="1350" dirty="0">
-                <a:latin typeface="Calibri" panose="020F0502020204030204" pitchFamily="34" charset="0"/>
-                <a:cs typeface="Calibri" panose="020F0502020204030204" pitchFamily="34" charset="0"/>
-              </a:rPr>
-              <a:t>the output of each element is the input of the next</a:t>
-            </a:r>
-          </a:p>
-        </p:txBody>
-      </p:sp>
-    </p:spTree>
-    <p:extLst>
-      <p:ext uri="{BB962C8B-B14F-4D97-AF65-F5344CB8AC3E}">
-        <p14:creationId xmlns:p14="http://schemas.microsoft.com/office/powerpoint/2010/main" val="151424586"/>
-      </p:ext>
-    </p:extLst>
-  </p:cSld>
-  <p:clrMapOvr>
-    <a:masterClrMapping/>
-  </p:clrMapOvr>
-</p:sld>
-</file>
-
 <file path=ppt/slides/slide12.xml><?xml version="1.0" encoding="utf-8"?>
 <p:sld xmlns:a="http://schemas.openxmlformats.org/drawingml/2006/main" xmlns:r="http://schemas.openxmlformats.org/officeDocument/2006/relationships" xmlns:p="http://schemas.openxmlformats.org/presentationml/2006/main">
   <p:cSld>
@@ -4099,7 +4029,7 @@
           <p:cNvPr id="2" name="Title 1">
             <a:extLst>
               <a:ext uri="{FF2B5EF4-FFF2-40B4-BE49-F238E27FC236}">
-                <a16:creationId xmlns:a16="http://schemas.microsoft.com/office/drawing/2014/main" id="{0B949EE9-871E-104A-960D-996FFBDB811F}"/>
+                <a16:creationId xmlns:a16="http://schemas.microsoft.com/office/drawing/2014/main" id="{4974A172-A87D-F14B-BB15-A8536564844B}"/>
               </a:ext>
             </a:extLst>
           </p:cNvPr>
@@ -4117,7 +4047,7 @@
           <a:p>
             <a:r>
               <a:rPr lang="en-US" dirty="0"/>
-              <a:t>Why use architectural patterns?</a:t>
+              <a:t>Levels – architectural patterns</a:t>
             </a:r>
           </a:p>
         </p:txBody>
@@ -4127,7 +4057,7 @@
           <p:cNvPr id="3" name="Content Placeholder 2">
             <a:extLst>
               <a:ext uri="{FF2B5EF4-FFF2-40B4-BE49-F238E27FC236}">
-                <a16:creationId xmlns:a16="http://schemas.microsoft.com/office/drawing/2014/main" id="{EDFECBAD-F3DB-474C-BE98-73BBE5C696F8}"/>
+                <a16:creationId xmlns:a16="http://schemas.microsoft.com/office/drawing/2014/main" id="{DA6B4C44-373A-524F-B8B1-3494285ED793}"/>
               </a:ext>
             </a:extLst>
           </p:cNvPr>
@@ -4145,7 +4075,7 @@
           <a:p>
             <a:r>
               <a:rPr lang="en-US" dirty="0"/>
-              <a:t>Communication shortcut</a:t>
+              <a:t>a general, reusable solution to a commonly occurring problem within a given context in software architecture</a:t>
             </a:r>
           </a:p>
           <a:p>
@@ -4154,42 +4084,97 @@
           <a:p>
             <a:r>
               <a:rPr lang="en-US" dirty="0"/>
-              <a:t>Don’t reinvent the wheel</a:t>
-            </a:r>
-          </a:p>
-          <a:p>
-            <a:endParaRPr lang="en-US" dirty="0"/>
-          </a:p>
-          <a:p>
-            <a:r>
-              <a:rPr lang="en-US" dirty="0"/>
-              <a:t>Standardized implementations</a:t>
-            </a:r>
-          </a:p>
-          <a:p>
-            <a:endParaRPr lang="en-US" dirty="0"/>
-          </a:p>
-          <a:p>
-            <a:r>
-              <a:rPr lang="en-US" i="1" dirty="0"/>
-              <a:t>Only so many [efficient] ways to solve non-domain problems.</a:t>
-            </a:r>
-          </a:p>
-          <a:p>
-            <a:endParaRPr lang="en-US" dirty="0"/>
-          </a:p>
-          <a:p>
-            <a:endParaRPr lang="en-US" dirty="0"/>
-          </a:p>
-          <a:p>
-            <a:endParaRPr lang="en-US" dirty="0"/>
+              <a:t>address various issues in software engineering, such as computer hardware </a:t>
+            </a:r>
+            <a:r>
+              <a:rPr lang="en-US" b="1" dirty="0"/>
+              <a:t>performance limitations</a:t>
+            </a:r>
+            <a:r>
+              <a:rPr lang="en-US" dirty="0"/>
+              <a:t>, </a:t>
+            </a:r>
+            <a:r>
+              <a:rPr lang="en-US" b="1" dirty="0"/>
+              <a:t>high availability</a:t>
+            </a:r>
+            <a:r>
+              <a:rPr lang="en-US" dirty="0"/>
+              <a:t> (HA), and minimization of a </a:t>
+            </a:r>
+            <a:r>
+              <a:rPr lang="en-US" b="1" dirty="0"/>
+              <a:t>business risk</a:t>
+            </a:r>
+          </a:p>
+        </p:txBody>
+      </p:sp>
+      <p:sp>
+        <p:nvSpPr>
+          <p:cNvPr id="5" name="TextBox 4">
+            <a:extLst>
+              <a:ext uri="{FF2B5EF4-FFF2-40B4-BE49-F238E27FC236}">
+                <a16:creationId xmlns:a16="http://schemas.microsoft.com/office/drawing/2014/main" id="{83C2C066-9014-724C-B20D-68198BA70AB3}"/>
+              </a:ext>
+            </a:extLst>
+          </p:cNvPr>
+          <p:cNvSpPr txBox="1"/>
+          <p:nvPr/>
+        </p:nvSpPr>
+        <p:spPr>
+          <a:xfrm>
+            <a:off x="2263923" y="6172200"/>
+            <a:ext cx="6502806" cy="507831"/>
+          </a:xfrm>
+          <a:prstGeom prst="rect">
+            <a:avLst/>
+          </a:prstGeom>
+          <a:solidFill>
+            <a:schemeClr val="bg1">
+              <a:lumMod val="95000"/>
+            </a:schemeClr>
+          </a:solidFill>
+        </p:spPr>
+        <p:txBody>
+          <a:bodyPr wrap="none" rtlCol="0">
+            <a:spAutoFit/>
+          </a:bodyPr>
+          <a:lstStyle/>
+          <a:p>
+            <a:r>
+              <a:rPr lang="en-US" sz="1350" b="1" dirty="0">
+                <a:latin typeface="Calibri" panose="020F0502020204030204" pitchFamily="34" charset="0"/>
+                <a:cs typeface="Calibri" panose="020F0502020204030204" pitchFamily="34" charset="0"/>
+              </a:rPr>
+              <a:t>Pipes and filters</a:t>
+            </a:r>
+            <a:r>
+              <a:rPr lang="en-US" sz="1350" dirty="0">
+                <a:latin typeface="Calibri" panose="020F0502020204030204" pitchFamily="34" charset="0"/>
+                <a:cs typeface="Calibri" panose="020F0502020204030204" pitchFamily="34" charset="0"/>
+              </a:rPr>
+              <a:t>: a pipeline consisting of a chain of processing elements, arranged so that </a:t>
+            </a:r>
+            <a:br>
+              <a:rPr lang="en-US" sz="1350" dirty="0">
+                <a:latin typeface="Calibri" panose="020F0502020204030204" pitchFamily="34" charset="0"/>
+                <a:cs typeface="Calibri" panose="020F0502020204030204" pitchFamily="34" charset="0"/>
+              </a:rPr>
+            </a:br>
+            <a:r>
+              <a:rPr lang="en-US" sz="1350" dirty="0">
+                <a:latin typeface="Calibri" panose="020F0502020204030204" pitchFamily="34" charset="0"/>
+                <a:cs typeface="Calibri" panose="020F0502020204030204" pitchFamily="34" charset="0"/>
+              </a:rPr>
+              <a:t>the output of each element is the input of the next</a:t>
+            </a:r>
           </a:p>
         </p:txBody>
       </p:sp>
     </p:spTree>
     <p:extLst>
       <p:ext uri="{BB962C8B-B14F-4D97-AF65-F5344CB8AC3E}">
-        <p14:creationId xmlns:p14="http://schemas.microsoft.com/office/powerpoint/2010/main" val="3507030181"/>
+        <p14:creationId xmlns:p14="http://schemas.microsoft.com/office/powerpoint/2010/main" val="151424586"/>
       </p:ext>
     </p:extLst>
   </p:cSld>
@@ -4221,6 +4206,128 @@
           <p:cNvPr id="2" name="Title 1">
             <a:extLst>
               <a:ext uri="{FF2B5EF4-FFF2-40B4-BE49-F238E27FC236}">
+                <a16:creationId xmlns:a16="http://schemas.microsoft.com/office/drawing/2014/main" id="{0B949EE9-871E-104A-960D-996FFBDB811F}"/>
+              </a:ext>
+            </a:extLst>
+          </p:cNvPr>
+          <p:cNvSpPr>
+            <a:spLocks noGrp="1"/>
+          </p:cNvSpPr>
+          <p:nvPr>
+            <p:ph type="title"/>
+          </p:nvPr>
+        </p:nvSpPr>
+        <p:spPr/>
+        <p:txBody>
+          <a:bodyPr/>
+          <a:lstStyle/>
+          <a:p>
+            <a:r>
+              <a:rPr lang="en-US" dirty="0"/>
+              <a:t>Why use architectural patterns?</a:t>
+            </a:r>
+          </a:p>
+        </p:txBody>
+      </p:sp>
+      <p:sp>
+        <p:nvSpPr>
+          <p:cNvPr id="3" name="Content Placeholder 2">
+            <a:extLst>
+              <a:ext uri="{FF2B5EF4-FFF2-40B4-BE49-F238E27FC236}">
+                <a16:creationId xmlns:a16="http://schemas.microsoft.com/office/drawing/2014/main" id="{EDFECBAD-F3DB-474C-BE98-73BBE5C696F8}"/>
+              </a:ext>
+            </a:extLst>
+          </p:cNvPr>
+          <p:cNvSpPr>
+            <a:spLocks noGrp="1"/>
+          </p:cNvSpPr>
+          <p:nvPr>
+            <p:ph idx="1"/>
+          </p:nvPr>
+        </p:nvSpPr>
+        <p:spPr/>
+        <p:txBody>
+          <a:bodyPr/>
+          <a:lstStyle/>
+          <a:p>
+            <a:r>
+              <a:rPr lang="en-US" dirty="0"/>
+              <a:t>Communication shortcut</a:t>
+            </a:r>
+          </a:p>
+          <a:p>
+            <a:endParaRPr lang="en-US" dirty="0"/>
+          </a:p>
+          <a:p>
+            <a:r>
+              <a:rPr lang="en-US" dirty="0"/>
+              <a:t>Don’t reinvent the wheel</a:t>
+            </a:r>
+          </a:p>
+          <a:p>
+            <a:endParaRPr lang="en-US" dirty="0"/>
+          </a:p>
+          <a:p>
+            <a:r>
+              <a:rPr lang="en-US" dirty="0"/>
+              <a:t>Standardized implementations</a:t>
+            </a:r>
+          </a:p>
+          <a:p>
+            <a:endParaRPr lang="en-US" dirty="0"/>
+          </a:p>
+          <a:p>
+            <a:r>
+              <a:rPr lang="en-US" i="1" dirty="0"/>
+              <a:t>Only so many [efficient] ways to solve non-domain problems.</a:t>
+            </a:r>
+          </a:p>
+          <a:p>
+            <a:endParaRPr lang="en-US" dirty="0"/>
+          </a:p>
+          <a:p>
+            <a:endParaRPr lang="en-US" dirty="0"/>
+          </a:p>
+          <a:p>
+            <a:endParaRPr lang="en-US" dirty="0"/>
+          </a:p>
+        </p:txBody>
+      </p:sp>
+    </p:spTree>
+    <p:extLst>
+      <p:ext uri="{BB962C8B-B14F-4D97-AF65-F5344CB8AC3E}">
+        <p14:creationId xmlns:p14="http://schemas.microsoft.com/office/powerpoint/2010/main" val="3507030181"/>
+      </p:ext>
+    </p:extLst>
+  </p:cSld>
+  <p:clrMapOvr>
+    <a:masterClrMapping/>
+  </p:clrMapOvr>
+</p:sld>
+</file>
+
+<file path=ppt/slides/slide14.xml><?xml version="1.0" encoding="utf-8"?>
+<p:sld xmlns:a="http://schemas.openxmlformats.org/drawingml/2006/main" xmlns:r="http://schemas.openxmlformats.org/officeDocument/2006/relationships" xmlns:p="http://schemas.openxmlformats.org/presentationml/2006/main">
+  <p:cSld>
+    <p:spTree>
+      <p:nvGrpSpPr>
+        <p:cNvPr id="1" name=""/>
+        <p:cNvGrpSpPr/>
+        <p:nvPr/>
+      </p:nvGrpSpPr>
+      <p:grpSpPr>
+        <a:xfrm>
+          <a:off x="0" y="0"/>
+          <a:ext cx="0" cy="0"/>
+          <a:chOff x="0" y="0"/>
+          <a:chExt cx="0" cy="0"/>
+        </a:xfrm>
+      </p:grpSpPr>
+      <p:sp>
+        <p:nvSpPr>
+          <p:cNvPr id="2" name="Title 1">
+            <a:extLst>
+              <a:ext uri="{FF2B5EF4-FFF2-40B4-BE49-F238E27FC236}">
                 <a16:creationId xmlns:a16="http://schemas.microsoft.com/office/drawing/2014/main" id="{B28CF4DA-E7DE-1D47-8E5F-3ECB8F1FA176}"/>
               </a:ext>
             </a:extLst>
@@ -4239,7 +4346,7 @@
           <a:p>
             <a:r>
               <a:rPr lang="en-US" dirty="0"/>
-              <a:t>Categories of architecture patterns</a:t>
+              <a:t>Categories of arch patterns</a:t>
             </a:r>
           </a:p>
         </p:txBody>
@@ -4505,102 +4612,6 @@
 </p:sld>
 </file>
 
-<file path=ppt/slides/slide14.xml><?xml version="1.0" encoding="utf-8"?>
-<p:sld xmlns:a="http://schemas.openxmlformats.org/drawingml/2006/main" xmlns:r="http://schemas.openxmlformats.org/officeDocument/2006/relationships" xmlns:p="http://schemas.openxmlformats.org/presentationml/2006/main">
-  <p:cSld>
-    <p:spTree>
-      <p:nvGrpSpPr>
-        <p:cNvPr id="1" name=""/>
-        <p:cNvGrpSpPr/>
-        <p:nvPr/>
-      </p:nvGrpSpPr>
-      <p:grpSpPr>
-        <a:xfrm>
-          <a:off x="0" y="0"/>
-          <a:ext cx="0" cy="0"/>
-          <a:chOff x="0" y="0"/>
-          <a:chExt cx="0" cy="0"/>
-        </a:xfrm>
-      </p:grpSpPr>
-      <p:sp>
-        <p:nvSpPr>
-          <p:cNvPr id="2" name="Title 1">
-            <a:extLst>
-              <a:ext uri="{FF2B5EF4-FFF2-40B4-BE49-F238E27FC236}">
-                <a16:creationId xmlns:a16="http://schemas.microsoft.com/office/drawing/2014/main" id="{A4B8CBF4-5945-2947-9F20-1FF986B633D0}"/>
-              </a:ext>
-            </a:extLst>
-          </p:cNvPr>
-          <p:cNvSpPr>
-            <a:spLocks noGrp="1"/>
-          </p:cNvSpPr>
-          <p:nvPr>
-            <p:ph type="title"/>
-          </p:nvPr>
-        </p:nvSpPr>
-        <p:spPr/>
-        <p:txBody>
-          <a:bodyPr/>
-          <a:lstStyle/>
-          <a:p>
-            <a:endParaRPr lang="en-US"/>
-          </a:p>
-        </p:txBody>
-      </p:sp>
-      <p:pic>
-        <p:nvPicPr>
-          <p:cNvPr id="4" name="Picture 6">
-            <a:extLst>
-              <a:ext uri="{FF2B5EF4-FFF2-40B4-BE49-F238E27FC236}">
-                <a16:creationId xmlns:a16="http://schemas.microsoft.com/office/drawing/2014/main" id="{6BDB61C2-E2A6-F243-8442-44D21CEDF58C}"/>
-              </a:ext>
-            </a:extLst>
-          </p:cNvPr>
-          <p:cNvPicPr>
-            <a:picLocks noGrp="1" noChangeAspect="1" noChangeArrowheads="1"/>
-          </p:cNvPicPr>
-          <p:nvPr>
-            <p:ph idx="1"/>
-          </p:nvPr>
-        </p:nvPicPr>
-        <p:blipFill>
-          <a:blip r:embed="rId2" cstate="print"/>
-          <a:srcRect/>
-          <a:stretch>
-            <a:fillRect/>
-          </a:stretch>
-        </p:blipFill>
-        <p:spPr bwMode="auto">
-          <a:xfrm>
-            <a:off x="2008316" y="1449215"/>
-            <a:ext cx="5127369" cy="4237826"/>
-          </a:xfrm>
-          <a:prstGeom prst="rect">
-            <a:avLst/>
-          </a:prstGeom>
-          <a:noFill/>
-          <a:ln w="12700">
-            <a:noFill/>
-            <a:miter lim="800000"/>
-            <a:headEnd/>
-            <a:tailEnd/>
-          </a:ln>
-          <a:effectLst/>
-        </p:spPr>
-      </p:pic>
-    </p:spTree>
-    <p:extLst>
-      <p:ext uri="{BB962C8B-B14F-4D97-AF65-F5344CB8AC3E}">
-        <p14:creationId xmlns:p14="http://schemas.microsoft.com/office/powerpoint/2010/main" val="3936721912"/>
-      </p:ext>
-    </p:extLst>
-  </p:cSld>
-  <p:clrMapOvr>
-    <a:masterClrMapping/>
-  </p:clrMapOvr>
-</p:sld>
-</file>
-
 <file path=ppt/slides/slide15.xml><?xml version="1.0" encoding="utf-8"?>
 <p:sld xmlns:a="http://schemas.openxmlformats.org/drawingml/2006/main" xmlns:r="http://schemas.openxmlformats.org/officeDocument/2006/relationships" xmlns:p="http://schemas.openxmlformats.org/presentationml/2006/main">
   <p:cSld>
@@ -4623,7 +4634,7 @@
           <p:cNvPr id="2" name="Title 1">
             <a:extLst>
               <a:ext uri="{FF2B5EF4-FFF2-40B4-BE49-F238E27FC236}">
-                <a16:creationId xmlns:a16="http://schemas.microsoft.com/office/drawing/2014/main" id="{865C116E-A5E4-F149-BDF9-8F684F86B3FE}"/>
+                <a16:creationId xmlns:a16="http://schemas.microsoft.com/office/drawing/2014/main" id="{A4B8CBF4-5945-2947-9F20-1FF986B633D0}"/>
               </a:ext>
             </a:extLst>
           </p:cNvPr>
@@ -4639,75 +4650,191 @@
           <a:bodyPr/>
           <a:lstStyle/>
           <a:p>
-            <a:r>
-              <a:rPr lang="en-US" dirty="0"/>
-              <a:t>TL;DR Our pattern language</a:t>
-            </a:r>
-          </a:p>
-        </p:txBody>
-      </p:sp>
-      <p:sp>
-        <p:nvSpPr>
-          <p:cNvPr id="3" name="Content Placeholder 2">
+            <a:endParaRPr lang="en-US"/>
+          </a:p>
+        </p:txBody>
+      </p:sp>
+      <p:pic>
+        <p:nvPicPr>
+          <p:cNvPr id="4" name="Picture 6">
             <a:extLst>
               <a:ext uri="{FF2B5EF4-FFF2-40B4-BE49-F238E27FC236}">
-                <a16:creationId xmlns:a16="http://schemas.microsoft.com/office/drawing/2014/main" id="{73C43041-4A8E-7B4B-8359-2EB70941D936}"/>
+                <a16:creationId xmlns:a16="http://schemas.microsoft.com/office/drawing/2014/main" id="{6BDB61C2-E2A6-F243-8442-44D21CEDF58C}"/>
               </a:ext>
             </a:extLst>
           </p:cNvPr>
-          <p:cNvSpPr>
-            <a:spLocks noGrp="1"/>
-          </p:cNvSpPr>
+          <p:cNvPicPr>
+            <a:picLocks noGrp="1" noChangeAspect="1" noChangeArrowheads="1"/>
+          </p:cNvPicPr>
           <p:nvPr>
             <p:ph idx="1"/>
           </p:nvPr>
-        </p:nvSpPr>
-        <p:spPr/>
-        <p:txBody>
-          <a:bodyPr/>
-          <a:lstStyle/>
-          <a:p>
-            <a:r>
-              <a:rPr lang="en-US" dirty="0"/>
-              <a:t>The pattern name</a:t>
-            </a:r>
-          </a:p>
-          <a:p>
-            <a:r>
-              <a:rPr lang="en-US" dirty="0"/>
-              <a:t>Scope of the problem</a:t>
-            </a:r>
-          </a:p>
-          <a:p>
-            <a:r>
-              <a:rPr lang="en-US" dirty="0"/>
-              <a:t>Challenges</a:t>
-            </a:r>
-          </a:p>
-          <a:p>
-            <a:r>
-              <a:rPr lang="en-US" dirty="0"/>
-              <a:t>Component/related patterns</a:t>
-            </a:r>
-          </a:p>
-          <a:p>
-            <a:r>
-              <a:rPr lang="en-US" dirty="0"/>
-              <a:t>Discussion</a:t>
-            </a:r>
+        </p:nvPicPr>
+        <p:blipFill>
+          <a:blip r:embed="rId2" cstate="print"/>
+          <a:srcRect/>
+          <a:stretch>
+            <a:fillRect/>
+          </a:stretch>
+        </p:blipFill>
+        <p:spPr bwMode="auto">
+          <a:xfrm>
+            <a:off x="752475" y="365126"/>
+            <a:ext cx="7639050" cy="6313757"/>
+          </a:xfrm>
+          <a:prstGeom prst="rect">
+            <a:avLst/>
+          </a:prstGeom>
+          <a:noFill/>
+          <a:ln w="12700">
+            <a:noFill/>
+            <a:miter lim="800000"/>
+            <a:headEnd/>
+            <a:tailEnd/>
+          </a:ln>
+          <a:effectLst/>
+        </p:spPr>
+      </p:pic>
+      <p:sp>
+        <p:nvSpPr>
+          <p:cNvPr id="6" name="Oval 5">
+            <a:extLst>
+              <a:ext uri="{FF2B5EF4-FFF2-40B4-BE49-F238E27FC236}">
+                <a16:creationId xmlns:a16="http://schemas.microsoft.com/office/drawing/2014/main" id="{77423DDA-E96C-1D41-8F41-45CD4D32F84C}"/>
+              </a:ext>
+            </a:extLst>
+          </p:cNvPr>
+          <p:cNvSpPr/>
+          <p:nvPr/>
+        </p:nvSpPr>
+        <p:spPr>
+          <a:xfrm>
+            <a:off x="3556000" y="203200"/>
+            <a:ext cx="2057400" cy="965200"/>
+          </a:xfrm>
+          <a:prstGeom prst="ellipse">
+            <a:avLst/>
+          </a:prstGeom>
+          <a:noFill/>
+          <a:ln w="57150">
+            <a:solidFill>
+              <a:srgbClr val="FF0000"/>
+            </a:solidFill>
+          </a:ln>
+        </p:spPr>
+        <p:style>
+          <a:lnRef idx="2">
+            <a:schemeClr val="accent1">
+              <a:shade val="50000"/>
+            </a:schemeClr>
+          </a:lnRef>
+          <a:fillRef idx="1">
+            <a:schemeClr val="accent1"/>
+          </a:fillRef>
+          <a:effectRef idx="0">
+            <a:schemeClr val="accent1"/>
+          </a:effectRef>
+          <a:fontRef idx="minor">
+            <a:schemeClr val="lt1"/>
+          </a:fontRef>
+        </p:style>
+        <p:txBody>
+          <a:bodyPr rtlCol="0" anchor="ctr"/>
+          <a:lstStyle/>
+          <a:p>
+            <a:pPr algn="ctr"/>
+            <a:endParaRPr lang="en-US"/>
           </a:p>
         </p:txBody>
       </p:sp>
     </p:spTree>
     <p:extLst>
       <p:ext uri="{BB962C8B-B14F-4D97-AF65-F5344CB8AC3E}">
-        <p14:creationId xmlns:p14="http://schemas.microsoft.com/office/powerpoint/2010/main" val="3391704348"/>
+        <p14:creationId xmlns:p14="http://schemas.microsoft.com/office/powerpoint/2010/main" val="3936721912"/>
       </p:ext>
     </p:extLst>
   </p:cSld>
   <p:clrMapOvr>
     <a:masterClrMapping/>
   </p:clrMapOvr>
+  <p:timing>
+    <p:tnLst>
+      <p:par>
+        <p:cTn id="1" dur="indefinite" restart="never" nodeType="tmRoot">
+          <p:childTnLst>
+            <p:seq concurrent="1" nextAc="seek">
+              <p:cTn id="2" dur="indefinite" nodeType="mainSeq">
+                <p:childTnLst>
+                  <p:par>
+                    <p:cTn id="3" fill="hold">
+                      <p:stCondLst>
+                        <p:cond delay="indefinite"/>
+                      </p:stCondLst>
+                      <p:childTnLst>
+                        <p:par>
+                          <p:cTn id="4" fill="hold">
+                            <p:stCondLst>
+                              <p:cond delay="0"/>
+                            </p:stCondLst>
+                            <p:childTnLst>
+                              <p:par>
+                                <p:cTn id="5" presetID="1" presetClass="entr" presetSubtype="0" fill="hold" grpId="0" nodeType="clickEffect">
+                                  <p:stCondLst>
+                                    <p:cond delay="0"/>
+                                  </p:stCondLst>
+                                  <p:childTnLst>
+                                    <p:set>
+                                      <p:cBhvr>
+                                        <p:cTn id="6" dur="1" fill="hold">
+                                          <p:stCondLst>
+                                            <p:cond delay="0"/>
+                                          </p:stCondLst>
+                                        </p:cTn>
+                                        <p:tgtEl>
+                                          <p:spTgt spid="6"/>
+                                        </p:tgtEl>
+                                        <p:attrNameLst>
+                                          <p:attrName>style.visibility</p:attrName>
+                                        </p:attrNameLst>
+                                      </p:cBhvr>
+                                      <p:to>
+                                        <p:strVal val="visible"/>
+                                      </p:to>
+                                    </p:set>
+                                  </p:childTnLst>
+                                </p:cTn>
+                              </p:par>
+                            </p:childTnLst>
+                          </p:cTn>
+                        </p:par>
+                      </p:childTnLst>
+                    </p:cTn>
+                  </p:par>
+                </p:childTnLst>
+              </p:cTn>
+              <p:prevCondLst>
+                <p:cond evt="onPrev" delay="0">
+                  <p:tgtEl>
+                    <p:sldTgt/>
+                  </p:tgtEl>
+                </p:cond>
+              </p:prevCondLst>
+              <p:nextCondLst>
+                <p:cond evt="onNext" delay="0">
+                  <p:tgtEl>
+                    <p:sldTgt/>
+                  </p:tgtEl>
+                </p:cond>
+              </p:nextCondLst>
+            </p:seq>
+          </p:childTnLst>
+        </p:cTn>
+      </p:par>
+    </p:tnLst>
+    <p:bldLst>
+      <p:bldP spid="6" grpId="0" animBg="1"/>
+    </p:bldLst>
+  </p:timing>
 </p:sld>
 </file>
 
@@ -4733,7 +4860,7 @@
           <p:cNvPr id="2" name="Title 1">
             <a:extLst>
               <a:ext uri="{FF2B5EF4-FFF2-40B4-BE49-F238E27FC236}">
-                <a16:creationId xmlns:a16="http://schemas.microsoft.com/office/drawing/2014/main" id="{747E071C-D10E-4C3A-87CD-069A84EDAFDE}"/>
+                <a16:creationId xmlns:a16="http://schemas.microsoft.com/office/drawing/2014/main" id="{865C116E-A5E4-F149-BDF9-8F684F86B3FE}"/>
               </a:ext>
             </a:extLst>
           </p:cNvPr>
@@ -4751,17 +4878,17 @@
           <a:p>
             <a:r>
               <a:rPr lang="en-US" dirty="0"/>
-              <a:t>Patterns to review</a:t>
-            </a:r>
-          </a:p>
-        </p:txBody>
-      </p:sp>
-      <p:sp>
-        <p:nvSpPr>
-          <p:cNvPr id="5" name="Content Placeholder 4">
+              <a:t>TL;DR Our pattern language</a:t>
+            </a:r>
+          </a:p>
+        </p:txBody>
+      </p:sp>
+      <p:sp>
+        <p:nvSpPr>
+          <p:cNvPr id="3" name="Content Placeholder 2">
             <a:extLst>
               <a:ext uri="{FF2B5EF4-FFF2-40B4-BE49-F238E27FC236}">
-                <a16:creationId xmlns:a16="http://schemas.microsoft.com/office/drawing/2014/main" id="{9411BFBA-52F6-F14A-A6F7-5D1F84B13D2E}"/>
+                <a16:creationId xmlns:a16="http://schemas.microsoft.com/office/drawing/2014/main" id="{73C43041-4A8E-7B4B-8359-2EB70941D936}"/>
               </a:ext>
             </a:extLst>
           </p:cNvPr>
@@ -4777,129 +4904,53 @@
           <a:bodyPr/>
           <a:lstStyle/>
           <a:p>
-            <a:pPr marL="214313" indent="-214313">
-              <a:lnSpc>
-                <a:spcPct val="100000"/>
-              </a:lnSpc>
-              <a:spcBef>
-                <a:spcPts val="0"/>
-              </a:spcBef>
-              <a:defRPr/>
-            </a:pPr>
-            <a:r>
-              <a:rPr lang="en-US" dirty="0"/>
-              <a:t>From Mud to Structure</a:t>
-            </a:r>
-          </a:p>
-          <a:p>
-            <a:pPr marL="671513" lvl="1" indent="-214313">
-              <a:lnSpc>
-                <a:spcPct val="100000"/>
-              </a:lnSpc>
-              <a:spcBef>
-                <a:spcPts val="0"/>
-              </a:spcBef>
-              <a:defRPr/>
-            </a:pPr>
-            <a:r>
-              <a:rPr lang="en-US" dirty="0"/>
-              <a:t>Layers</a:t>
-            </a:r>
-          </a:p>
-          <a:p>
-            <a:pPr marL="671513" lvl="1" indent="-214313">
-              <a:lnSpc>
-                <a:spcPct val="100000"/>
-              </a:lnSpc>
-              <a:spcBef>
-                <a:spcPts val="0"/>
-              </a:spcBef>
-              <a:defRPr/>
-            </a:pPr>
-            <a:r>
-              <a:rPr lang="en-US" dirty="0"/>
-              <a:t>Pipes and filters</a:t>
-            </a:r>
-          </a:p>
-          <a:p>
-            <a:pPr marL="671513" lvl="1" indent="-214313"/>
-            <a:r>
-              <a:rPr lang="en-US" dirty="0"/>
-              <a:t>MVC</a:t>
-            </a:r>
-          </a:p>
-          <a:p>
-            <a:pPr marL="671513" lvl="1" indent="-214313">
-              <a:lnSpc>
-                <a:spcPct val="100000"/>
-              </a:lnSpc>
-              <a:spcBef>
-                <a:spcPts val="0"/>
-              </a:spcBef>
-              <a:defRPr/>
-            </a:pPr>
-            <a:r>
-              <a:rPr lang="en-US" dirty="0"/>
-              <a:t>Pub-Sub</a:t>
-            </a:r>
-          </a:p>
-          <a:p>
-            <a:pPr marL="671513" lvl="1" indent="-214313">
-              <a:lnSpc>
-                <a:spcPct val="100000"/>
-              </a:lnSpc>
-              <a:spcBef>
-                <a:spcPts val="0"/>
-              </a:spcBef>
-              <a:defRPr/>
-            </a:pPr>
-            <a:r>
-              <a:rPr lang="en-US" dirty="0"/>
-              <a:t>Microkernel</a:t>
-            </a:r>
-          </a:p>
-          <a:p>
-            <a:pPr marL="671513" lvl="1" indent="-214313">
-              <a:lnSpc>
-                <a:spcPct val="100000"/>
-              </a:lnSpc>
-              <a:spcBef>
-                <a:spcPts val="0"/>
-              </a:spcBef>
-              <a:defRPr/>
-            </a:pPr>
-            <a:r>
-              <a:rPr lang="en-US" dirty="0"/>
-              <a:t>Blackboard / Tuple Spaces</a:t>
-            </a:r>
-          </a:p>
-          <a:p>
-            <a:pPr marL="671513" lvl="1" indent="-214313">
-              <a:lnSpc>
-                <a:spcPct val="100000"/>
-              </a:lnSpc>
-              <a:spcBef>
-                <a:spcPts val="0"/>
-              </a:spcBef>
-              <a:defRPr/>
-            </a:pPr>
-            <a:r>
-              <a:rPr lang="en-US" dirty="0"/>
-              <a:t>Actor*</a:t>
-            </a:r>
-          </a:p>
-          <a:p>
-            <a:pPr marL="0" indent="0">
-              <a:buNone/>
-            </a:pPr>
-            <a:endParaRPr lang="en-US" dirty="0"/>
+            <a:r>
+              <a:rPr lang="en-US" dirty="0"/>
+              <a:t>The pattern </a:t>
+            </a:r>
+            <a:r>
+              <a:rPr lang="en-US" b="1" dirty="0"/>
+              <a:t>name</a:t>
+            </a:r>
+          </a:p>
+          <a:p>
+            <a:r>
+              <a:rPr lang="en-US" b="1" dirty="0"/>
+              <a:t>Scope</a:t>
+            </a:r>
+            <a:r>
+              <a:rPr lang="en-US" dirty="0"/>
+              <a:t> of the problem</a:t>
+            </a:r>
+          </a:p>
+          <a:p>
+            <a:r>
+              <a:rPr lang="en-US" b="1" dirty="0"/>
+              <a:t>Challenges</a:t>
+            </a:r>
+          </a:p>
+          <a:p>
+            <a:r>
+              <a:rPr lang="en-US" b="1" dirty="0"/>
+              <a:t>Components</a:t>
+            </a:r>
+            <a:r>
+              <a:rPr lang="en-US" dirty="0"/>
+              <a:t> / related patterns</a:t>
+            </a:r>
+          </a:p>
+          <a:p>
+            <a:r>
+              <a:rPr lang="en-US" b="1" dirty="0"/>
+              <a:t>Discussion</a:t>
+            </a:r>
           </a:p>
         </p:txBody>
       </p:sp>
     </p:spTree>
     <p:extLst>
       <p:ext uri="{BB962C8B-B14F-4D97-AF65-F5344CB8AC3E}">
-        <p14:creationId xmlns:p14="http://schemas.microsoft.com/office/powerpoint/2010/main" val="4084926389"/>
+        <p14:creationId xmlns:p14="http://schemas.microsoft.com/office/powerpoint/2010/main" val="3391704348"/>
       </p:ext>
     </p:extLst>
   </p:cSld>
@@ -4931,7 +4982,7 @@
           <p:cNvPr id="2" name="Title 1">
             <a:extLst>
               <a:ext uri="{FF2B5EF4-FFF2-40B4-BE49-F238E27FC236}">
-                <a16:creationId xmlns:a16="http://schemas.microsoft.com/office/drawing/2014/main" id="{3C98E203-CC01-6F4E-A4FB-97F01224B6B8}"/>
+                <a16:creationId xmlns:a16="http://schemas.microsoft.com/office/drawing/2014/main" id="{747E071C-D10E-4C3A-87CD-069A84EDAFDE}"/>
               </a:ext>
             </a:extLst>
           </p:cNvPr>
@@ -4949,17 +5000,17 @@
           <a:p>
             <a:r>
               <a:rPr lang="en-US" dirty="0"/>
-              <a:t>From Mud to Structure: Layers</a:t>
-            </a:r>
-          </a:p>
-        </p:txBody>
-      </p:sp>
-      <p:sp>
-        <p:nvSpPr>
-          <p:cNvPr id="3" name="Content Placeholder 2">
+              <a:t>Patterns to review</a:t>
+            </a:r>
+          </a:p>
+        </p:txBody>
+      </p:sp>
+      <p:sp>
+        <p:nvSpPr>
+          <p:cNvPr id="5" name="Content Placeholder 4">
             <a:extLst>
               <a:ext uri="{FF2B5EF4-FFF2-40B4-BE49-F238E27FC236}">
-                <a16:creationId xmlns:a16="http://schemas.microsoft.com/office/drawing/2014/main" id="{F063E8CA-BB75-444A-8C02-FB20A2540A75}"/>
+                <a16:creationId xmlns:a16="http://schemas.microsoft.com/office/drawing/2014/main" id="{9411BFBA-52F6-F14A-A6F7-5D1F84B13D2E}"/>
               </a:ext>
             </a:extLst>
           </p:cNvPr>
@@ -4972,72 +5023,138 @@
         </p:nvSpPr>
         <p:spPr/>
         <p:txBody>
-          <a:bodyPr/>
-          <a:lstStyle/>
-          <a:p>
-            <a:r>
-              <a:rPr lang="en-US" dirty="0"/>
-              <a:t>Must support the independent development of different system parts</a:t>
-            </a:r>
-          </a:p>
-          <a:p>
+          <a:bodyPr>
+            <a:normAutofit/>
+          </a:bodyPr>
+          <a:lstStyle/>
+          <a:p>
+            <a:pPr marL="214313" indent="-214313">
+              <a:lnSpc>
+                <a:spcPct val="100000"/>
+              </a:lnSpc>
+              <a:spcBef>
+                <a:spcPts val="0"/>
+              </a:spcBef>
+              <a:defRPr/>
+            </a:pPr>
+            <a:r>
+              <a:rPr lang="en-US" dirty="0"/>
+              <a:t>Layers</a:t>
+            </a:r>
+          </a:p>
+          <a:p>
+            <a:pPr marL="214313" indent="-214313">
+              <a:lnSpc>
+                <a:spcPct val="100000"/>
+              </a:lnSpc>
+              <a:spcBef>
+                <a:spcPts val="0"/>
+              </a:spcBef>
+              <a:defRPr/>
+            </a:pPr>
+            <a:r>
+              <a:rPr lang="en-US" dirty="0"/>
+              <a:t>Pipes and filters</a:t>
+            </a:r>
+          </a:p>
+          <a:p>
+            <a:pPr marL="214313" indent="-214313"/>
+            <a:r>
+              <a:rPr lang="en-US" dirty="0"/>
+              <a:t>MVC</a:t>
+            </a:r>
+          </a:p>
+          <a:p>
+            <a:pPr marL="214313" indent="-214313">
+              <a:lnSpc>
+                <a:spcPct val="100000"/>
+              </a:lnSpc>
+              <a:spcBef>
+                <a:spcPts val="0"/>
+              </a:spcBef>
+              <a:defRPr/>
+            </a:pPr>
+            <a:r>
+              <a:rPr lang="en-US" dirty="0"/>
+              <a:t>Pub-Sub</a:t>
+            </a:r>
+          </a:p>
+          <a:p>
+            <a:pPr marL="214313" indent="-214313">
+              <a:lnSpc>
+                <a:spcPct val="100000"/>
+              </a:lnSpc>
+              <a:spcBef>
+                <a:spcPts val="0"/>
+              </a:spcBef>
+              <a:defRPr/>
+            </a:pPr>
+            <a:r>
+              <a:rPr lang="en-US" dirty="0"/>
+              <a:t>Microkernel</a:t>
+            </a:r>
+          </a:p>
+          <a:p>
+            <a:pPr marL="214313" indent="-214313">
+              <a:lnSpc>
+                <a:spcPct val="100000"/>
+              </a:lnSpc>
+              <a:spcBef>
+                <a:spcPts val="0"/>
+              </a:spcBef>
+              <a:defRPr/>
+            </a:pPr>
+            <a:r>
+              <a:rPr lang="en-US" dirty="0"/>
+              <a:t>Blackboard / Tuple Spaces</a:t>
+            </a:r>
+          </a:p>
+          <a:p>
+            <a:pPr marL="214313" indent="-214313">
+              <a:lnSpc>
+                <a:spcPct val="100000"/>
+              </a:lnSpc>
+              <a:spcBef>
+                <a:spcPts val="0"/>
+              </a:spcBef>
+              <a:defRPr/>
+            </a:pPr>
+            <a:r>
+              <a:rPr lang="en-US" dirty="0"/>
+              <a:t>Actor*</a:t>
+            </a:r>
+          </a:p>
+          <a:p>
+            <a:pPr marL="214313" indent="-214313">
+              <a:lnSpc>
+                <a:spcPct val="100000"/>
+              </a:lnSpc>
+              <a:spcBef>
+                <a:spcPts val="0"/>
+              </a:spcBef>
+              <a:defRPr/>
+            </a:pPr>
             <a:endParaRPr lang="en-US" dirty="0"/>
           </a:p>
           <a:p>
-            <a:r>
-              <a:rPr lang="en-US" dirty="0"/>
-              <a:t>Challenge: </a:t>
-            </a:r>
-            <a:r>
-              <a:rPr lang="en-US" i="1" dirty="0"/>
-              <a:t>separation of concerns</a:t>
-            </a:r>
-            <a:endParaRPr lang="en-US" dirty="0"/>
-          </a:p>
-          <a:p>
-            <a:endParaRPr lang="en-US" dirty="0"/>
-          </a:p>
-          <a:p>
-            <a:r>
-              <a:rPr lang="en-US" dirty="0"/>
-              <a:t>Components: </a:t>
-            </a:r>
-            <a:r>
-              <a:rPr lang="en-US" cap="small" dirty="0"/>
-              <a:t>Explicit Interfaces</a:t>
-            </a:r>
-            <a:r>
-              <a:rPr lang="en-US" dirty="0"/>
-              <a:t>, </a:t>
-            </a:r>
-            <a:r>
-              <a:rPr lang="en-US" cap="small" dirty="0"/>
-              <a:t>Encapsulated Implementation</a:t>
-            </a:r>
-            <a:r>
-              <a:rPr lang="en-US" dirty="0"/>
-              <a:t>, </a:t>
-            </a:r>
-            <a:r>
-              <a:rPr lang="en-US" cap="small" dirty="0"/>
-              <a:t>Commands</a:t>
-            </a:r>
-            <a:r>
-              <a:rPr lang="en-US" dirty="0"/>
-              <a:t>/</a:t>
-            </a:r>
-            <a:r>
-              <a:rPr lang="en-US" cap="small" dirty="0"/>
-              <a:t>Messages, Data Transfer Objects (DTOs)</a:t>
-            </a:r>
-          </a:p>
-          <a:p>
-            <a:endParaRPr lang="en-US" dirty="0"/>
-          </a:p>
-          <a:p>
-            <a:endParaRPr lang="en-US" dirty="0"/>
-          </a:p>
-          <a:p>
+            <a:pPr marL="214313" indent="-214313">
+              <a:lnSpc>
+                <a:spcPct val="100000"/>
+              </a:lnSpc>
+              <a:spcBef>
+                <a:spcPts val="0"/>
+              </a:spcBef>
+              <a:defRPr/>
+            </a:pPr>
+            <a:r>
+              <a:rPr lang="en-US" dirty="0"/>
+              <a:t>(category: From Mud to Structure)</a:t>
+            </a:r>
+          </a:p>
+          <a:p>
+            <a:pPr marL="0" indent="0">
+              <a:buNone/>
+            </a:pPr>
             <a:endParaRPr lang="en-US" dirty="0"/>
           </a:p>
         </p:txBody>
@@ -5045,7 +5162,7 @@
     </p:spTree>
     <p:extLst>
       <p:ext uri="{BB962C8B-B14F-4D97-AF65-F5344CB8AC3E}">
-        <p14:creationId xmlns:p14="http://schemas.microsoft.com/office/powerpoint/2010/main" val="3088785597"/>
+        <p14:creationId xmlns:p14="http://schemas.microsoft.com/office/powerpoint/2010/main" val="4084926389"/>
       </p:ext>
     </p:extLst>
   </p:cSld>
@@ -5095,7 +5212,7 @@
           <a:p>
             <a:r>
               <a:rPr lang="en-US" dirty="0"/>
-              <a:t>From Mud to Structure: Pipes &amp; Filters</a:t>
+              <a:t>Layers</a:t>
             </a:r>
           </a:p>
         </p:txBody>
@@ -5118,14 +5235,12 @@
         </p:nvSpPr>
         <p:spPr/>
         <p:txBody>
-          <a:bodyPr>
-            <a:normAutofit lnSpcReduction="10000"/>
-          </a:bodyPr>
-          <a:lstStyle/>
-          <a:p>
-            <a:r>
-              <a:rPr lang="en-US" dirty="0"/>
-              <a:t>Must sometimes provide a design that is suitable for processing data streams</a:t>
+          <a:bodyPr/>
+          <a:lstStyle/>
+          <a:p>
+            <a:r>
+              <a:rPr lang="en-US" dirty="0"/>
+              <a:t>Must support the independent development of different system parts</a:t>
             </a:r>
           </a:p>
           <a:p>
@@ -5134,28 +5249,11 @@
           <a:p>
             <a:r>
               <a:rPr lang="en-US" dirty="0"/>
-              <a:t>Challenges: </a:t>
-            </a:r>
-          </a:p>
-          <a:p>
-            <a:pPr lvl="1"/>
+              <a:t>Challenge: </a:t>
+            </a:r>
             <a:r>
               <a:rPr lang="en-US" i="1" dirty="0"/>
-              <a:t>Common request/response semantics don’t work for streams</a:t>
-            </a:r>
-          </a:p>
-          <a:p>
-            <a:pPr lvl="1"/>
-            <a:r>
-              <a:rPr lang="en-US" i="1" dirty="0"/>
-              <a:t>Debugging</a:t>
-            </a:r>
-          </a:p>
-          <a:p>
-            <a:pPr lvl="1"/>
-            <a:r>
-              <a:rPr lang="en-US" i="1" dirty="0"/>
-              <a:t>Async</a:t>
+              <a:t>separation of concerns</a:t>
             </a:r>
             <a:endParaRPr lang="en-US" dirty="0"/>
           </a:p>
@@ -5169,7 +5267,7 @@
             </a:r>
             <a:r>
               <a:rPr lang="en-US" cap="small" dirty="0"/>
-              <a:t>Domain Objects</a:t>
+              <a:t>Explicit Interfaces</a:t>
             </a:r>
             <a:r>
               <a:rPr lang="en-US" dirty="0"/>
@@ -5177,50 +5275,40 @@
             </a:r>
             <a:r>
               <a:rPr lang="en-US" cap="small" dirty="0"/>
-              <a:t>Messages</a:t>
-            </a:r>
-          </a:p>
-        </p:txBody>
-      </p:sp>
-      <p:sp>
-        <p:nvSpPr>
-          <p:cNvPr id="4" name="TextBox 3">
-            <a:extLst>
-              <a:ext uri="{FF2B5EF4-FFF2-40B4-BE49-F238E27FC236}">
-                <a16:creationId xmlns:a16="http://schemas.microsoft.com/office/drawing/2014/main" id="{E8DF36CC-DA0F-3747-8A2E-1314D3ADADC9}"/>
-              </a:ext>
-            </a:extLst>
-          </p:cNvPr>
-          <p:cNvSpPr txBox="1"/>
-          <p:nvPr/>
-        </p:nvSpPr>
-        <p:spPr>
-          <a:xfrm>
-            <a:off x="6170284" y="6176963"/>
-            <a:ext cx="2345066" cy="300082"/>
-          </a:xfrm>
-          <a:prstGeom prst="rect">
-            <a:avLst/>
-          </a:prstGeom>
-          <a:noFill/>
-        </p:spPr>
-        <p:txBody>
-          <a:bodyPr wrap="none" rtlCol="0">
-            <a:spAutoFit/>
-          </a:bodyPr>
-          <a:lstStyle/>
-          <a:p>
-            <a:r>
-              <a:rPr lang="en-US" sz="1350" i="1" dirty="0"/>
-              <a:t>Enterprise Integration Patterns</a:t>
-            </a:r>
+              <a:t>Encapsulated Implementation</a:t>
+            </a:r>
+            <a:r>
+              <a:rPr lang="en-US" dirty="0"/>
+              <a:t>, </a:t>
+            </a:r>
+            <a:r>
+              <a:rPr lang="en-US" cap="small" dirty="0"/>
+              <a:t>Commands</a:t>
+            </a:r>
+            <a:r>
+              <a:rPr lang="en-US" dirty="0"/>
+              <a:t>/</a:t>
+            </a:r>
+            <a:r>
+              <a:rPr lang="en-US" cap="small" dirty="0"/>
+              <a:t>Messages, Data Transfer Objects (DTOs)</a:t>
+            </a:r>
+          </a:p>
+          <a:p>
+            <a:endParaRPr lang="en-US" dirty="0"/>
+          </a:p>
+          <a:p>
+            <a:endParaRPr lang="en-US" dirty="0"/>
+          </a:p>
+          <a:p>
+            <a:endParaRPr lang="en-US" dirty="0"/>
           </a:p>
         </p:txBody>
       </p:sp>
     </p:spTree>
     <p:extLst>
       <p:ext uri="{BB962C8B-B14F-4D97-AF65-F5344CB8AC3E}">
-        <p14:creationId xmlns:p14="http://schemas.microsoft.com/office/powerpoint/2010/main" val="3724363984"/>
+        <p14:creationId xmlns:p14="http://schemas.microsoft.com/office/powerpoint/2010/main" val="3088785597"/>
       </p:ext>
     </p:extLst>
   </p:cSld>
@@ -5270,7 +5358,7 @@
           <a:p>
             <a:r>
               <a:rPr lang="en-US" dirty="0"/>
-              <a:t>From Mud to Structure: MVC</a:t>
+              <a:t>Pipes &amp; Filters</a:t>
             </a:r>
           </a:p>
         </p:txBody>
@@ -5294,13 +5382,13 @@
         <p:spPr/>
         <p:txBody>
           <a:bodyPr>
-            <a:normAutofit fontScale="92500" lnSpcReduction="10000"/>
+            <a:normAutofit lnSpcReduction="10000"/>
           </a:bodyPr>
           <a:lstStyle/>
           <a:p>
             <a:r>
               <a:rPr lang="en-US" dirty="0"/>
-              <a:t>Must consider that the UI of an application changes more frequently than its domain functionality</a:t>
+              <a:t>Must sometimes provide a design that is suitable for processing data streams</a:t>
             </a:r>
           </a:p>
           <a:p>
@@ -5316,15 +5404,21 @@
             <a:pPr lvl="1"/>
             <a:r>
               <a:rPr lang="en-US" i="1" dirty="0"/>
-              <a:t>Changes to UI </a:t>
-            </a:r>
-            <a:r>
-              <a:rPr lang="en-US" b="1" i="1" dirty="0"/>
-              <a:t>must not </a:t>
-            </a:r>
+              <a:t>Common request/response semantics don’t work for streams</a:t>
+            </a:r>
+          </a:p>
+          <a:p>
+            <a:pPr lvl="1"/>
             <a:r>
               <a:rPr lang="en-US" i="1" dirty="0"/>
-              <a:t>affect the app’s core functionality</a:t>
+              <a:t>Debugging</a:t>
+            </a:r>
+          </a:p>
+          <a:p>
+            <a:pPr lvl="1"/>
+            <a:r>
+              <a:rPr lang="en-US" i="1" dirty="0"/>
+              <a:t>Async</a:t>
             </a:r>
             <a:endParaRPr lang="en-US" dirty="0"/>
           </a:p>
@@ -5336,33 +5430,60 @@
               <a:rPr lang="en-US" dirty="0"/>
               <a:t>Components: </a:t>
             </a:r>
-          </a:p>
-          <a:p>
-            <a:pPr lvl="1"/>
-            <a:r>
-              <a:rPr lang="en-US" dirty="0"/>
-              <a:t>Model (processing), Controller (input), View (output)</a:t>
-            </a:r>
-          </a:p>
-          <a:p>
-            <a:pPr lvl="1"/>
             <a:r>
               <a:rPr lang="en-US" cap="small" dirty="0"/>
-              <a:t>Domain Objects, Template View, Transform View, Page Controller, Command Processor, Data Transfer Objects (DTOs), Observer</a:t>
-            </a:r>
-          </a:p>
-          <a:p>
-            <a:endParaRPr lang="en-US" dirty="0"/>
-          </a:p>
-          <a:p>
-            <a:endParaRPr lang="en-US" dirty="0"/>
+              <a:t>Domain Objects</a:t>
+            </a:r>
+            <a:r>
+              <a:rPr lang="en-US" dirty="0"/>
+              <a:t>, </a:t>
+            </a:r>
+            <a:r>
+              <a:rPr lang="en-US" cap="small" dirty="0"/>
+              <a:t>Messages</a:t>
+            </a:r>
+          </a:p>
+        </p:txBody>
+      </p:sp>
+      <p:sp>
+        <p:nvSpPr>
+          <p:cNvPr id="4" name="TextBox 3">
+            <a:extLst>
+              <a:ext uri="{FF2B5EF4-FFF2-40B4-BE49-F238E27FC236}">
+                <a16:creationId xmlns:a16="http://schemas.microsoft.com/office/drawing/2014/main" id="{E8DF36CC-DA0F-3747-8A2E-1314D3ADADC9}"/>
+              </a:ext>
+            </a:extLst>
+          </p:cNvPr>
+          <p:cNvSpPr txBox="1"/>
+          <p:nvPr/>
+        </p:nvSpPr>
+        <p:spPr>
+          <a:xfrm>
+            <a:off x="6170284" y="6176963"/>
+            <a:ext cx="2345066" cy="300082"/>
+          </a:xfrm>
+          <a:prstGeom prst="rect">
+            <a:avLst/>
+          </a:prstGeom>
+          <a:noFill/>
+        </p:spPr>
+        <p:txBody>
+          <a:bodyPr wrap="none" rtlCol="0">
+            <a:spAutoFit/>
+          </a:bodyPr>
+          <a:lstStyle/>
+          <a:p>
+            <a:r>
+              <a:rPr lang="en-US" sz="1350" i="1" dirty="0"/>
+              <a:t>Enterprise Integration Patterns</a:t>
+            </a:r>
           </a:p>
         </p:txBody>
       </p:sp>
     </p:spTree>
     <p:extLst>
       <p:ext uri="{BB962C8B-B14F-4D97-AF65-F5344CB8AC3E}">
-        <p14:creationId xmlns:p14="http://schemas.microsoft.com/office/powerpoint/2010/main" val="2101584496"/>
+        <p14:creationId xmlns:p14="http://schemas.microsoft.com/office/powerpoint/2010/main" val="3724363984"/>
       </p:ext>
     </p:extLst>
   </p:cSld>
@@ -5519,7 +5640,7 @@
           <a:p>
             <a:r>
               <a:rPr lang="en-US" dirty="0"/>
-              <a:t>From Mud to Structure: Publish-Subscribe</a:t>
+              <a:t>MVC (Model-View-Controller)</a:t>
             </a:r>
           </a:p>
         </p:txBody>
@@ -5543,13 +5664,13 @@
         <p:spPr/>
         <p:txBody>
           <a:bodyPr>
-            <a:normAutofit lnSpcReduction="10000"/>
+            <a:normAutofit fontScale="92500" lnSpcReduction="10000"/>
           </a:bodyPr>
           <a:lstStyle/>
           <a:p>
             <a:r>
               <a:rPr lang="en-US" dirty="0"/>
-              <a:t>Often need an infrastructure that allows components to notify each other about events of interest</a:t>
+              <a:t>Must consider that the UI of an application changes more frequently than its domain functionality</a:t>
             </a:r>
           </a:p>
           <a:p>
@@ -5565,79 +5686,53 @@
             <a:pPr lvl="1"/>
             <a:r>
               <a:rPr lang="en-US" i="1" dirty="0"/>
-              <a:t>Robust notification system to coordinate state change</a:t>
+              <a:t>Changes to UI </a:t>
+            </a:r>
+            <a:r>
+              <a:rPr lang="en-US" b="1" i="1" dirty="0"/>
+              <a:t>must not </a:t>
+            </a:r>
+            <a:r>
+              <a:rPr lang="en-US" i="1" dirty="0"/>
+              <a:t>affect the app’s core functionality</a:t>
+            </a:r>
+            <a:endParaRPr lang="en-US" dirty="0"/>
+          </a:p>
+          <a:p>
+            <a:endParaRPr lang="en-US" dirty="0"/>
+          </a:p>
+          <a:p>
+            <a:r>
+              <a:rPr lang="en-US" dirty="0"/>
+              <a:t>Components: </a:t>
             </a:r>
           </a:p>
           <a:p>
             <a:pPr lvl="1"/>
             <a:r>
-              <a:rPr lang="en-US" i="1" dirty="0"/>
-              <a:t>Asynchronous</a:t>
+              <a:rPr lang="en-US" dirty="0"/>
+              <a:t>Model (processing), Controller (input), View (output)</a:t>
+            </a:r>
+          </a:p>
+          <a:p>
+            <a:pPr lvl="1"/>
+            <a:r>
+              <a:rPr lang="en-US" cap="small" dirty="0"/>
+              <a:t>Domain Objects, Template View, Transform View, Page Controller, Command Processor, Data Transfer Objects (DTOs), Observer</a:t>
             </a:r>
           </a:p>
           <a:p>
             <a:endParaRPr lang="en-US" dirty="0"/>
           </a:p>
           <a:p>
-            <a:r>
-              <a:rPr lang="en-US" dirty="0"/>
-              <a:t>Components: </a:t>
-            </a:r>
-          </a:p>
-          <a:p>
-            <a:pPr lvl="1"/>
-            <a:r>
-              <a:rPr lang="en-US" cap="small" dirty="0"/>
-              <a:t>Messaging, Broker, Event-Driven Consumers</a:t>
-            </a:r>
-          </a:p>
-          <a:p>
             <a:endParaRPr lang="en-US" dirty="0"/>
-          </a:p>
-          <a:p>
-            <a:endParaRPr lang="en-US" dirty="0"/>
-          </a:p>
-        </p:txBody>
-      </p:sp>
-      <p:sp>
-        <p:nvSpPr>
-          <p:cNvPr id="5" name="TextBox 4">
-            <a:extLst>
-              <a:ext uri="{FF2B5EF4-FFF2-40B4-BE49-F238E27FC236}">
-                <a16:creationId xmlns:a16="http://schemas.microsoft.com/office/drawing/2014/main" id="{CD9940AA-DA03-FD47-9001-41ADE70CC61F}"/>
-              </a:ext>
-            </a:extLst>
-          </p:cNvPr>
-          <p:cNvSpPr txBox="1"/>
-          <p:nvPr/>
-        </p:nvSpPr>
-        <p:spPr>
-          <a:xfrm>
-            <a:off x="6170284" y="6176963"/>
-            <a:ext cx="2345066" cy="300082"/>
-          </a:xfrm>
-          <a:prstGeom prst="rect">
-            <a:avLst/>
-          </a:prstGeom>
-          <a:noFill/>
-        </p:spPr>
-        <p:txBody>
-          <a:bodyPr wrap="none" rtlCol="0">
-            <a:spAutoFit/>
-          </a:bodyPr>
-          <a:lstStyle/>
-          <a:p>
-            <a:r>
-              <a:rPr lang="en-US" sz="1350" i="1" dirty="0"/>
-              <a:t>Enterprise Integration Patterns</a:t>
-            </a:r>
           </a:p>
         </p:txBody>
       </p:sp>
     </p:spTree>
     <p:extLst>
       <p:ext uri="{BB962C8B-B14F-4D97-AF65-F5344CB8AC3E}">
-        <p14:creationId xmlns:p14="http://schemas.microsoft.com/office/powerpoint/2010/main" val="412403791"/>
+        <p14:creationId xmlns:p14="http://schemas.microsoft.com/office/powerpoint/2010/main" val="2101584496"/>
       </p:ext>
     </p:extLst>
   </p:cSld>
@@ -5687,7 +5782,7 @@
           <a:p>
             <a:r>
               <a:rPr lang="en-US" dirty="0"/>
-              <a:t>From Mud to Structure: Microkernel</a:t>
+              <a:t>Publisher-Subscriber (Pub-Sub)</a:t>
             </a:r>
           </a:p>
         </p:txBody>
@@ -5711,20 +5806,13 @@
         <p:spPr/>
         <p:txBody>
           <a:bodyPr>
-            <a:normAutofit/>
+            <a:normAutofit lnSpcReduction="10000"/>
           </a:bodyPr>
           <a:lstStyle/>
           <a:p>
             <a:r>
               <a:rPr lang="en-US" dirty="0"/>
-              <a:t>Must design support for functional scalability and adaptability</a:t>
-            </a:r>
-            <a:br>
-              <a:rPr lang="en-US" dirty="0"/>
-            </a:br>
-            <a:r>
-              <a:rPr lang="en-US" dirty="0"/>
-              <a:t>(multiple versions simultaneously)</a:t>
+              <a:t>Often need an infrastructure that allows components to notify each other about events of interest</a:t>
             </a:r>
           </a:p>
           <a:p>
@@ -5740,7 +5828,14 @@
             <a:pPr lvl="1"/>
             <a:r>
               <a:rPr lang="en-US" i="1" dirty="0"/>
-              <a:t>Data model versioning</a:t>
+              <a:t>Robust notification system to coordinate state change</a:t>
+            </a:r>
+          </a:p>
+          <a:p>
+            <a:pPr lvl="1"/>
+            <a:r>
+              <a:rPr lang="en-US" i="1" dirty="0"/>
+              <a:t>Asynchronous</a:t>
             </a:r>
           </a:p>
           <a:p>
@@ -5756,24 +5851,56 @@
             <a:pPr lvl="1"/>
             <a:r>
               <a:rPr lang="en-US" cap="small" dirty="0"/>
-              <a:t>Layers (</a:t>
-            </a:r>
-            <a:r>
-              <a:rPr lang="en-US" dirty="0"/>
-              <a:t>esp. routing layer</a:t>
-            </a:r>
-            <a:r>
-              <a:rPr lang="en-US" cap="small" dirty="0"/>
-              <a:t>), Object Adapter</a:t>
-            </a:r>
+              <a:t>Messaging, Broker, Event-Driven Consumers</a:t>
+            </a:r>
+          </a:p>
+          <a:p>
             <a:endParaRPr lang="en-US" dirty="0"/>
+          </a:p>
+          <a:p>
+            <a:endParaRPr lang="en-US" dirty="0"/>
+          </a:p>
+        </p:txBody>
+      </p:sp>
+      <p:sp>
+        <p:nvSpPr>
+          <p:cNvPr id="5" name="TextBox 4">
+            <a:extLst>
+              <a:ext uri="{FF2B5EF4-FFF2-40B4-BE49-F238E27FC236}">
+                <a16:creationId xmlns:a16="http://schemas.microsoft.com/office/drawing/2014/main" id="{CD9940AA-DA03-FD47-9001-41ADE70CC61F}"/>
+              </a:ext>
+            </a:extLst>
+          </p:cNvPr>
+          <p:cNvSpPr txBox="1"/>
+          <p:nvPr/>
+        </p:nvSpPr>
+        <p:spPr>
+          <a:xfrm>
+            <a:off x="6170284" y="6176963"/>
+            <a:ext cx="2345066" cy="300082"/>
+          </a:xfrm>
+          <a:prstGeom prst="rect">
+            <a:avLst/>
+          </a:prstGeom>
+          <a:noFill/>
+        </p:spPr>
+        <p:txBody>
+          <a:bodyPr wrap="none" rtlCol="0">
+            <a:spAutoFit/>
+          </a:bodyPr>
+          <a:lstStyle/>
+          <a:p>
+            <a:r>
+              <a:rPr lang="en-US" sz="1350" i="1" dirty="0"/>
+              <a:t>Enterprise Integration Patterns</a:t>
+            </a:r>
           </a:p>
         </p:txBody>
       </p:sp>
     </p:spTree>
     <p:extLst>
       <p:ext uri="{BB962C8B-B14F-4D97-AF65-F5344CB8AC3E}">
-        <p14:creationId xmlns:p14="http://schemas.microsoft.com/office/powerpoint/2010/main" val="1221895983"/>
+        <p14:creationId xmlns:p14="http://schemas.microsoft.com/office/powerpoint/2010/main" val="412403791"/>
       </p:ext>
     </p:extLst>
   </p:cSld>
@@ -5816,6 +5943,142 @@
             <p:ph type="title"/>
           </p:nvPr>
         </p:nvSpPr>
+        <p:spPr/>
+        <p:txBody>
+          <a:bodyPr/>
+          <a:lstStyle/>
+          <a:p>
+            <a:r>
+              <a:rPr lang="en-US" dirty="0"/>
+              <a:t>Microkernel</a:t>
+            </a:r>
+          </a:p>
+        </p:txBody>
+      </p:sp>
+      <p:sp>
+        <p:nvSpPr>
+          <p:cNvPr id="3" name="Content Placeholder 2">
+            <a:extLst>
+              <a:ext uri="{FF2B5EF4-FFF2-40B4-BE49-F238E27FC236}">
+                <a16:creationId xmlns:a16="http://schemas.microsoft.com/office/drawing/2014/main" id="{F063E8CA-BB75-444A-8C02-FB20A2540A75}"/>
+              </a:ext>
+            </a:extLst>
+          </p:cNvPr>
+          <p:cNvSpPr>
+            <a:spLocks noGrp="1"/>
+          </p:cNvSpPr>
+          <p:nvPr>
+            <p:ph idx="1"/>
+          </p:nvPr>
+        </p:nvSpPr>
+        <p:spPr/>
+        <p:txBody>
+          <a:bodyPr>
+            <a:normAutofit/>
+          </a:bodyPr>
+          <a:lstStyle/>
+          <a:p>
+            <a:r>
+              <a:rPr lang="en-US" dirty="0"/>
+              <a:t>Must design support for functional scalability and adaptability</a:t>
+            </a:r>
+            <a:br>
+              <a:rPr lang="en-US" dirty="0"/>
+            </a:br>
+            <a:r>
+              <a:rPr lang="en-US" dirty="0"/>
+              <a:t>(multiple versions simultaneously)</a:t>
+            </a:r>
+          </a:p>
+          <a:p>
+            <a:endParaRPr lang="en-US" dirty="0"/>
+          </a:p>
+          <a:p>
+            <a:r>
+              <a:rPr lang="en-US" dirty="0"/>
+              <a:t>Challenges: </a:t>
+            </a:r>
+          </a:p>
+          <a:p>
+            <a:pPr lvl="1"/>
+            <a:r>
+              <a:rPr lang="en-US" i="1" dirty="0"/>
+              <a:t>Data model versioning</a:t>
+            </a:r>
+          </a:p>
+          <a:p>
+            <a:endParaRPr lang="en-US" dirty="0"/>
+          </a:p>
+          <a:p>
+            <a:r>
+              <a:rPr lang="en-US" dirty="0"/>
+              <a:t>Components: </a:t>
+            </a:r>
+          </a:p>
+          <a:p>
+            <a:pPr lvl="1"/>
+            <a:r>
+              <a:rPr lang="en-US" cap="small" dirty="0"/>
+              <a:t>Layers (</a:t>
+            </a:r>
+            <a:r>
+              <a:rPr lang="en-US" dirty="0"/>
+              <a:t>esp. routing layer</a:t>
+            </a:r>
+            <a:r>
+              <a:rPr lang="en-US" cap="small" dirty="0"/>
+              <a:t>), Object Adapter</a:t>
+            </a:r>
+            <a:endParaRPr lang="en-US" dirty="0"/>
+          </a:p>
+        </p:txBody>
+      </p:sp>
+    </p:spTree>
+    <p:extLst>
+      <p:ext uri="{BB962C8B-B14F-4D97-AF65-F5344CB8AC3E}">
+        <p14:creationId xmlns:p14="http://schemas.microsoft.com/office/powerpoint/2010/main" val="1221895983"/>
+      </p:ext>
+    </p:extLst>
+  </p:cSld>
+  <p:clrMapOvr>
+    <a:masterClrMapping/>
+  </p:clrMapOvr>
+</p:sld>
+</file>
+
+<file path=ppt/slides/slide23.xml><?xml version="1.0" encoding="utf-8"?>
+<p:sld xmlns:a="http://schemas.openxmlformats.org/drawingml/2006/main" xmlns:r="http://schemas.openxmlformats.org/officeDocument/2006/relationships" xmlns:p="http://schemas.openxmlformats.org/presentationml/2006/main">
+  <p:cSld>
+    <p:spTree>
+      <p:nvGrpSpPr>
+        <p:cNvPr id="1" name=""/>
+        <p:cNvGrpSpPr/>
+        <p:nvPr/>
+      </p:nvGrpSpPr>
+      <p:grpSpPr>
+        <a:xfrm>
+          <a:off x="0" y="0"/>
+          <a:ext cx="0" cy="0"/>
+          <a:chOff x="0" y="0"/>
+          <a:chExt cx="0" cy="0"/>
+        </a:xfrm>
+      </p:grpSpPr>
+      <p:sp>
+        <p:nvSpPr>
+          <p:cNvPr id="2" name="Title 1">
+            <a:extLst>
+              <a:ext uri="{FF2B5EF4-FFF2-40B4-BE49-F238E27FC236}">
+                <a16:creationId xmlns:a16="http://schemas.microsoft.com/office/drawing/2014/main" id="{3C98E203-CC01-6F4E-A4FB-97F01224B6B8}"/>
+              </a:ext>
+            </a:extLst>
+          </p:cNvPr>
+          <p:cNvSpPr>
+            <a:spLocks noGrp="1"/>
+          </p:cNvSpPr>
+          <p:nvPr>
+            <p:ph type="title"/>
+          </p:nvPr>
+        </p:nvSpPr>
         <p:spPr>
           <a:xfrm>
             <a:off x="628650" y="365126"/>
@@ -5828,7 +6091,7 @@
           <a:p>
             <a:r>
               <a:rPr lang="en-US" dirty="0"/>
-              <a:t>From Mud to Structure: Blackboard</a:t>
+              <a:t>Blackboard</a:t>
             </a:r>
           </a:p>
         </p:txBody>
@@ -6014,8 +6277,8 @@
         </p:nvSpPr>
         <p:spPr>
           <a:xfrm>
-            <a:off x="6984683" y="1239836"/>
-            <a:ext cx="1718547" cy="323165"/>
+            <a:off x="3452783" y="827852"/>
+            <a:ext cx="2238433" cy="400110"/>
           </a:xfrm>
           <a:prstGeom prst="rect">
             <a:avLst/>
@@ -6029,7 +6292,7 @@
           <a:lstStyle/>
           <a:p>
             <a:r>
-              <a:rPr lang="en-US" sz="1500" dirty="0"/>
+              <a:rPr lang="en-US" sz="2000" dirty="0"/>
               <a:t>AKA “Tuple Spaces”</a:t>
             </a:r>
           </a:p>
@@ -6039,92 +6302,6 @@
     <p:extLst>
       <p:ext uri="{BB962C8B-B14F-4D97-AF65-F5344CB8AC3E}">
         <p14:creationId xmlns:p14="http://schemas.microsoft.com/office/powerpoint/2010/main" val="2944654476"/>
-      </p:ext>
-    </p:extLst>
-  </p:cSld>
-  <p:clrMapOvr>
-    <a:masterClrMapping/>
-  </p:clrMapOvr>
-</p:sld>
-</file>
-
-<file path=ppt/slides/slide23.xml><?xml version="1.0" encoding="utf-8"?>
-<p:sld xmlns:a="http://schemas.openxmlformats.org/drawingml/2006/main" xmlns:r="http://schemas.openxmlformats.org/officeDocument/2006/relationships" xmlns:p="http://schemas.openxmlformats.org/presentationml/2006/main">
-  <p:cSld>
-    <p:spTree>
-      <p:nvGrpSpPr>
-        <p:cNvPr id="1" name=""/>
-        <p:cNvGrpSpPr/>
-        <p:nvPr/>
-      </p:nvGrpSpPr>
-      <p:grpSpPr>
-        <a:xfrm>
-          <a:off x="0" y="0"/>
-          <a:ext cx="0" cy="0"/>
-          <a:chOff x="0" y="0"/>
-          <a:chExt cx="0" cy="0"/>
-        </a:xfrm>
-      </p:grpSpPr>
-      <p:sp>
-        <p:nvSpPr>
-          <p:cNvPr id="4" name="Title 3">
-            <a:extLst>
-              <a:ext uri="{FF2B5EF4-FFF2-40B4-BE49-F238E27FC236}">
-                <a16:creationId xmlns:a16="http://schemas.microsoft.com/office/drawing/2014/main" id="{0E1F6BA8-C814-6B41-96E7-CE984F3E574A}"/>
-              </a:ext>
-            </a:extLst>
-          </p:cNvPr>
-          <p:cNvSpPr>
-            <a:spLocks noGrp="1"/>
-          </p:cNvSpPr>
-          <p:nvPr>
-            <p:ph type="title"/>
-          </p:nvPr>
-        </p:nvSpPr>
-        <p:spPr/>
-        <p:txBody>
-          <a:bodyPr/>
-          <a:lstStyle/>
-          <a:p>
-            <a:r>
-              <a:rPr lang="en-US" dirty="0"/>
-              <a:t>Case Study</a:t>
-            </a:r>
-          </a:p>
-        </p:txBody>
-      </p:sp>
-      <p:sp>
-        <p:nvSpPr>
-          <p:cNvPr id="5" name="Text Placeholder 4">
-            <a:extLst>
-              <a:ext uri="{FF2B5EF4-FFF2-40B4-BE49-F238E27FC236}">
-                <a16:creationId xmlns:a16="http://schemas.microsoft.com/office/drawing/2014/main" id="{2DE170E8-9FF2-BB46-9C93-D0913E34E811}"/>
-              </a:ext>
-            </a:extLst>
-          </p:cNvPr>
-          <p:cNvSpPr>
-            <a:spLocks noGrp="1"/>
-          </p:cNvSpPr>
-          <p:nvPr>
-            <p:ph type="body" idx="1"/>
-          </p:nvPr>
-        </p:nvSpPr>
-        <p:spPr/>
-        <p:txBody>
-          <a:bodyPr/>
-          <a:lstStyle/>
-          <a:p>
-            <a:r>
-              <a:rPr lang="en-US" dirty="0"/>
-              <a:t>TNG calculator logic</a:t>
-            </a:r>
-          </a:p>
-        </p:txBody>
-      </p:sp>
-    </p:spTree>
-    <p:extLst>
-      <p:ext uri="{BB962C8B-B14F-4D97-AF65-F5344CB8AC3E}">
-        <p14:creationId xmlns:p14="http://schemas.microsoft.com/office/powerpoint/2010/main" val="4026083186"/>
       </p:ext>
     </p:extLst>
   </p:cSld>
@@ -6153,10 +6330,10 @@
       </p:grpSpPr>
       <p:sp>
         <p:nvSpPr>
-          <p:cNvPr id="2" name="Title 1">
+          <p:cNvPr id="4" name="Title 3">
             <a:extLst>
               <a:ext uri="{FF2B5EF4-FFF2-40B4-BE49-F238E27FC236}">
-                <a16:creationId xmlns:a16="http://schemas.microsoft.com/office/drawing/2014/main" id="{A28DABD7-350D-814A-95D4-88A33B3B65D0}"/>
+                <a16:creationId xmlns:a16="http://schemas.microsoft.com/office/drawing/2014/main" id="{0E1F6BA8-C814-6B41-96E7-CE984F3E574A}"/>
               </a:ext>
             </a:extLst>
           </p:cNvPr>
@@ -6174,17 +6351,17 @@
           <a:p>
             <a:r>
               <a:rPr lang="en-US" dirty="0"/>
-              <a:t>References</a:t>
-            </a:r>
-          </a:p>
-        </p:txBody>
-      </p:sp>
-      <p:sp>
-        <p:nvSpPr>
-          <p:cNvPr id="3" name="Content Placeholder 2">
+              <a:t>Case Study</a:t>
+            </a:r>
+          </a:p>
+        </p:txBody>
+      </p:sp>
+      <p:sp>
+        <p:nvSpPr>
+          <p:cNvPr id="5" name="Text Placeholder 4">
             <a:extLst>
               <a:ext uri="{FF2B5EF4-FFF2-40B4-BE49-F238E27FC236}">
-                <a16:creationId xmlns:a16="http://schemas.microsoft.com/office/drawing/2014/main" id="{9503D80F-0A32-554F-B7A5-C6F6F8BF2492}"/>
+                <a16:creationId xmlns:a16="http://schemas.microsoft.com/office/drawing/2014/main" id="{2DE170E8-9FF2-BB46-9C93-D0913E34E811}"/>
               </a:ext>
             </a:extLst>
           </p:cNvPr>
@@ -6192,84 +6369,25 @@
             <a:spLocks noGrp="1"/>
           </p:cNvSpPr>
           <p:nvPr>
-            <p:ph idx="1"/>
-          </p:nvPr>
-        </p:nvSpPr>
-        <p:spPr/>
-        <p:txBody>
-          <a:bodyPr>
-            <a:normAutofit fontScale="92500"/>
-          </a:bodyPr>
-          <a:lstStyle/>
-          <a:p>
-            <a:r>
-              <a:rPr lang="en-US" i="1" dirty="0"/>
-              <a:t>Patterns of Software Architecture </a:t>
-            </a:r>
-            <a:r>
-              <a:rPr lang="en-US" dirty="0"/>
-              <a:t>(4 volumes), pub. Wiley Press</a:t>
-            </a:r>
-          </a:p>
-          <a:p>
-            <a:r>
-              <a:rPr lang="en-US" dirty="0"/>
-              <a:t>Wiley Series in Software Design Patterns</a:t>
-            </a:r>
-          </a:p>
-          <a:p>
-            <a:r>
-              <a:rPr lang="en-US" i="1" dirty="0"/>
-              <a:t>Enterprise Integration Patterns</a:t>
-            </a:r>
-            <a:r>
-              <a:rPr lang="en-US" dirty="0"/>
-              <a:t>, pub. Addison Wesley</a:t>
-            </a:r>
-          </a:p>
-          <a:p>
-            <a:r>
-              <a:rPr lang="en-US" i="1" dirty="0"/>
-              <a:t>Patterns of Enterprise Application Architecture</a:t>
-            </a:r>
-            <a:r>
-              <a:rPr lang="en-US" dirty="0"/>
-              <a:t>, pub. Addison Wesley</a:t>
-            </a:r>
-            <a:endParaRPr lang="en-US" i="1" dirty="0"/>
-          </a:p>
-          <a:p>
-            <a:r>
-              <a:rPr lang="en-US" i="1" dirty="0"/>
-              <a:t>Framework Design Guidelines: Conventions, Idioms, and Patterns for Reusable .NET Libraries</a:t>
-            </a:r>
-            <a:r>
-              <a:rPr lang="en-US" dirty="0"/>
-              <a:t>, pub. Addison Wesley</a:t>
-            </a:r>
-            <a:endParaRPr lang="en-US" i="1" dirty="0"/>
-          </a:p>
-          <a:p>
-            <a:r>
-              <a:rPr lang="en-US" dirty="0">
-                <a:latin typeface="Courier" pitchFamily="2" charset="0"/>
-              </a:rPr>
-              <a:t>wiki.c2.com</a:t>
-            </a:r>
-            <a:r>
-              <a:rPr lang="en-US" dirty="0"/>
-              <a:t> (Agile, patterns, etc.)</a:t>
-            </a:r>
-          </a:p>
-          <a:p>
-            <a:endParaRPr lang="en-US" dirty="0"/>
+            <p:ph type="body" idx="1"/>
+          </p:nvPr>
+        </p:nvSpPr>
+        <p:spPr/>
+        <p:txBody>
+          <a:bodyPr/>
+          <a:lstStyle/>
+          <a:p>
+            <a:r>
+              <a:rPr lang="en-US" dirty="0"/>
+              <a:t>Sales tax calculator logic</a:t>
+            </a:r>
           </a:p>
         </p:txBody>
       </p:sp>
     </p:spTree>
     <p:extLst>
       <p:ext uri="{BB962C8B-B14F-4D97-AF65-F5344CB8AC3E}">
-        <p14:creationId xmlns:p14="http://schemas.microsoft.com/office/powerpoint/2010/main" val="518781248"/>
+        <p14:creationId xmlns:p14="http://schemas.microsoft.com/office/powerpoint/2010/main" val="4026083186"/>
       </p:ext>
     </p:extLst>
   </p:cSld>
@@ -6298,6 +6416,151 @@
       </p:grpSpPr>
       <p:sp>
         <p:nvSpPr>
+          <p:cNvPr id="2" name="Title 1">
+            <a:extLst>
+              <a:ext uri="{FF2B5EF4-FFF2-40B4-BE49-F238E27FC236}">
+                <a16:creationId xmlns:a16="http://schemas.microsoft.com/office/drawing/2014/main" id="{A28DABD7-350D-814A-95D4-88A33B3B65D0}"/>
+              </a:ext>
+            </a:extLst>
+          </p:cNvPr>
+          <p:cNvSpPr>
+            <a:spLocks noGrp="1"/>
+          </p:cNvSpPr>
+          <p:nvPr>
+            <p:ph type="title"/>
+          </p:nvPr>
+        </p:nvSpPr>
+        <p:spPr/>
+        <p:txBody>
+          <a:bodyPr/>
+          <a:lstStyle/>
+          <a:p>
+            <a:r>
+              <a:rPr lang="en-US" dirty="0"/>
+              <a:t>References</a:t>
+            </a:r>
+          </a:p>
+        </p:txBody>
+      </p:sp>
+      <p:sp>
+        <p:nvSpPr>
+          <p:cNvPr id="3" name="Content Placeholder 2">
+            <a:extLst>
+              <a:ext uri="{FF2B5EF4-FFF2-40B4-BE49-F238E27FC236}">
+                <a16:creationId xmlns:a16="http://schemas.microsoft.com/office/drawing/2014/main" id="{9503D80F-0A32-554F-B7A5-C6F6F8BF2492}"/>
+              </a:ext>
+            </a:extLst>
+          </p:cNvPr>
+          <p:cNvSpPr>
+            <a:spLocks noGrp="1"/>
+          </p:cNvSpPr>
+          <p:nvPr>
+            <p:ph idx="1"/>
+          </p:nvPr>
+        </p:nvSpPr>
+        <p:spPr/>
+        <p:txBody>
+          <a:bodyPr>
+            <a:normAutofit fontScale="92500"/>
+          </a:bodyPr>
+          <a:lstStyle/>
+          <a:p>
+            <a:r>
+              <a:rPr lang="en-US" i="1" dirty="0"/>
+              <a:t>Patterns of Software Architecture </a:t>
+            </a:r>
+            <a:r>
+              <a:rPr lang="en-US" dirty="0"/>
+              <a:t>(4 volumes), pub. Wiley Press</a:t>
+            </a:r>
+          </a:p>
+          <a:p>
+            <a:r>
+              <a:rPr lang="en-US" dirty="0"/>
+              <a:t>Wiley Series in Software Design Patterns</a:t>
+            </a:r>
+          </a:p>
+          <a:p>
+            <a:r>
+              <a:rPr lang="en-US" i="1" dirty="0"/>
+              <a:t>Enterprise Integration Patterns</a:t>
+            </a:r>
+            <a:r>
+              <a:rPr lang="en-US" dirty="0"/>
+              <a:t>, pub. Addison Wesley</a:t>
+            </a:r>
+          </a:p>
+          <a:p>
+            <a:r>
+              <a:rPr lang="en-US" i="1" dirty="0"/>
+              <a:t>Patterns of Enterprise Application Architecture</a:t>
+            </a:r>
+            <a:r>
+              <a:rPr lang="en-US" dirty="0"/>
+              <a:t>, pub. Addison Wesley</a:t>
+            </a:r>
+            <a:endParaRPr lang="en-US" i="1" dirty="0"/>
+          </a:p>
+          <a:p>
+            <a:r>
+              <a:rPr lang="en-US" i="1" dirty="0"/>
+              <a:t>Framework Design Guidelines: Conventions, Idioms, and Patterns for Reusable .NET Libraries</a:t>
+            </a:r>
+            <a:r>
+              <a:rPr lang="en-US" dirty="0"/>
+              <a:t>, pub. Addison Wesley</a:t>
+            </a:r>
+            <a:endParaRPr lang="en-US" i="1" dirty="0"/>
+          </a:p>
+          <a:p>
+            <a:r>
+              <a:rPr lang="en-US" dirty="0">
+                <a:latin typeface="Courier" pitchFamily="2" charset="0"/>
+              </a:rPr>
+              <a:t>wiki.c2.com</a:t>
+            </a:r>
+            <a:r>
+              <a:rPr lang="en-US" dirty="0"/>
+              <a:t> (Agile, patterns, etc.)</a:t>
+            </a:r>
+          </a:p>
+          <a:p>
+            <a:endParaRPr lang="en-US" dirty="0"/>
+          </a:p>
+        </p:txBody>
+      </p:sp>
+    </p:spTree>
+    <p:extLst>
+      <p:ext uri="{BB962C8B-B14F-4D97-AF65-F5344CB8AC3E}">
+        <p14:creationId xmlns:p14="http://schemas.microsoft.com/office/powerpoint/2010/main" val="518781248"/>
+      </p:ext>
+    </p:extLst>
+  </p:cSld>
+  <p:clrMapOvr>
+    <a:masterClrMapping/>
+  </p:clrMapOvr>
+</p:sld>
+</file>
+
+<file path=ppt/slides/slide26.xml><?xml version="1.0" encoding="utf-8"?>
+<p:sld xmlns:a="http://schemas.openxmlformats.org/drawingml/2006/main" xmlns:r="http://schemas.openxmlformats.org/officeDocument/2006/relationships" xmlns:p="http://schemas.openxmlformats.org/presentationml/2006/main">
+  <p:cSld>
+    <p:spTree>
+      <p:nvGrpSpPr>
+        <p:cNvPr id="1" name=""/>
+        <p:cNvGrpSpPr/>
+        <p:nvPr/>
+      </p:nvGrpSpPr>
+      <p:grpSpPr>
+        <a:xfrm>
+          <a:off x="0" y="0"/>
+          <a:ext cx="0" cy="0"/>
+          <a:chOff x="0" y="0"/>
+          <a:chExt cx="0" cy="0"/>
+        </a:xfrm>
+      </p:grpSpPr>
+      <p:sp>
+        <p:nvSpPr>
           <p:cNvPr id="6" name="Title 5">
             <a:extLst>
               <a:ext uri="{FF2B5EF4-FFF2-40B4-BE49-F238E27FC236}">
@@ -6362,7 +6625,7 @@
 </p:sld>
 </file>
 
-<file path=ppt/slides/slide26.xml><?xml version="1.0" encoding="utf-8"?>
+<file path=ppt/slides/slide27.xml><?xml version="1.0" encoding="utf-8"?>
 <p:sld xmlns:a="http://schemas.openxmlformats.org/drawingml/2006/main" xmlns:r="http://schemas.openxmlformats.org/officeDocument/2006/relationships" xmlns:p="http://schemas.openxmlformats.org/presentationml/2006/main">
   <p:cSld>
     <p:spTree>
@@ -6644,6 +6907,89 @@
 </file>
 
 <file path=ppt/slides/slide4.xml><?xml version="1.0" encoding="utf-8"?>
+<p:sld xmlns:a="http://schemas.openxmlformats.org/drawingml/2006/main" xmlns:r="http://schemas.openxmlformats.org/officeDocument/2006/relationships" xmlns:p="http://schemas.openxmlformats.org/presentationml/2006/main">
+  <p:cSld>
+    <p:spTree>
+      <p:nvGrpSpPr>
+        <p:cNvPr id="1" name=""/>
+        <p:cNvGrpSpPr/>
+        <p:nvPr/>
+      </p:nvGrpSpPr>
+      <p:grpSpPr>
+        <a:xfrm>
+          <a:off x="0" y="0"/>
+          <a:ext cx="0" cy="0"/>
+          <a:chOff x="0" y="0"/>
+          <a:chExt cx="0" cy="0"/>
+        </a:xfrm>
+      </p:grpSpPr>
+      <p:sp>
+        <p:nvSpPr>
+          <p:cNvPr id="4" name="Title 3">
+            <a:extLst>
+              <a:ext uri="{FF2B5EF4-FFF2-40B4-BE49-F238E27FC236}">
+                <a16:creationId xmlns:a16="http://schemas.microsoft.com/office/drawing/2014/main" id="{AB5ADE82-0C4A-D746-A0A7-1B52BDA26AB6}"/>
+              </a:ext>
+            </a:extLst>
+          </p:cNvPr>
+          <p:cNvSpPr>
+            <a:spLocks noGrp="1"/>
+          </p:cNvSpPr>
+          <p:nvPr>
+            <p:ph type="title"/>
+          </p:nvPr>
+        </p:nvSpPr>
+        <p:spPr/>
+        <p:txBody>
+          <a:bodyPr/>
+          <a:lstStyle/>
+          <a:p>
+            <a:r>
+              <a:rPr lang="en-US" dirty="0"/>
+              <a:t>Design Patterns Review</a:t>
+            </a:r>
+          </a:p>
+        </p:txBody>
+      </p:sp>
+      <p:sp>
+        <p:nvSpPr>
+          <p:cNvPr id="5" name="Text Placeholder 4">
+            <a:extLst>
+              <a:ext uri="{FF2B5EF4-FFF2-40B4-BE49-F238E27FC236}">
+                <a16:creationId xmlns:a16="http://schemas.microsoft.com/office/drawing/2014/main" id="{C9D5AD25-13A5-894C-B412-7E6397BF0E69}"/>
+              </a:ext>
+            </a:extLst>
+          </p:cNvPr>
+          <p:cNvSpPr>
+            <a:spLocks noGrp="1"/>
+          </p:cNvSpPr>
+          <p:nvPr>
+            <p:ph type="body" idx="1"/>
+          </p:nvPr>
+        </p:nvSpPr>
+        <p:spPr/>
+        <p:txBody>
+          <a:bodyPr/>
+          <a:lstStyle/>
+          <a:p>
+            <a:endParaRPr lang="en-US"/>
+          </a:p>
+        </p:txBody>
+      </p:sp>
+    </p:spTree>
+    <p:extLst>
+      <p:ext uri="{BB962C8B-B14F-4D97-AF65-F5344CB8AC3E}">
+        <p14:creationId xmlns:p14="http://schemas.microsoft.com/office/powerpoint/2010/main" val="2277133885"/>
+      </p:ext>
+    </p:extLst>
+  </p:cSld>
+  <p:clrMapOvr>
+    <a:masterClrMapping/>
+  </p:clrMapOvr>
+</p:sld>
+</file>
+
+<file path=ppt/slides/slide5.xml><?xml version="1.0" encoding="utf-8"?>
 <p:sld xmlns:a="http://schemas.openxmlformats.org/drawingml/2006/main" xmlns:r="http://schemas.openxmlformats.org/officeDocument/2006/relationships" xmlns:p="http://schemas.openxmlformats.org/presentationml/2006/main">
   <p:cSld>
     <p:spTree>
@@ -6952,7 +7298,7 @@
 </p:sld>
 </file>
 
-<file path=ppt/slides/slide5.xml><?xml version="1.0" encoding="utf-8"?>
+<file path=ppt/slides/slide6.xml><?xml version="1.0" encoding="utf-8"?>
 <p:sld xmlns:a="http://schemas.openxmlformats.org/drawingml/2006/main" xmlns:r="http://schemas.openxmlformats.org/officeDocument/2006/relationships" xmlns:p="http://schemas.openxmlformats.org/presentationml/2006/main">
   <p:cSld>
     <p:spTree>
@@ -7322,104 +7668,6 @@
 </p:sld>
 </file>
 
-<file path=ppt/slides/slide6.xml><?xml version="1.0" encoding="utf-8"?>
-<p:sld xmlns:a="http://schemas.openxmlformats.org/drawingml/2006/main" xmlns:r="http://schemas.openxmlformats.org/officeDocument/2006/relationships" xmlns:p="http://schemas.openxmlformats.org/presentationml/2006/main">
-  <p:cSld>
-    <p:spTree>
-      <p:nvGrpSpPr>
-        <p:cNvPr id="1" name=""/>
-        <p:cNvGrpSpPr/>
-        <p:nvPr/>
-      </p:nvGrpSpPr>
-      <p:grpSpPr>
-        <a:xfrm>
-          <a:off x="0" y="0"/>
-          <a:ext cx="0" cy="0"/>
-          <a:chOff x="0" y="0"/>
-          <a:chExt cx="0" cy="0"/>
-        </a:xfrm>
-      </p:grpSpPr>
-      <p:sp>
-        <p:nvSpPr>
-          <p:cNvPr id="2" name="Title 1">
-            <a:extLst>
-              <a:ext uri="{FF2B5EF4-FFF2-40B4-BE49-F238E27FC236}">
-                <a16:creationId xmlns:a16="http://schemas.microsoft.com/office/drawing/2014/main" id="{691056BE-E16B-CB49-95A2-31D21440DF9D}"/>
-              </a:ext>
-            </a:extLst>
-          </p:cNvPr>
-          <p:cNvSpPr>
-            <a:spLocks noGrp="1"/>
-          </p:cNvSpPr>
-          <p:nvPr>
-            <p:ph type="title"/>
-          </p:nvPr>
-        </p:nvSpPr>
-        <p:spPr/>
-        <p:txBody>
-          <a:bodyPr/>
-          <a:lstStyle/>
-          <a:p>
-            <a:r>
-              <a:rPr lang="en-US" dirty="0"/>
-              <a:t>Levels of patterns</a:t>
-            </a:r>
-          </a:p>
-        </p:txBody>
-      </p:sp>
-      <p:sp>
-        <p:nvSpPr>
-          <p:cNvPr id="3" name="Content Placeholder 2">
-            <a:extLst>
-              <a:ext uri="{FF2B5EF4-FFF2-40B4-BE49-F238E27FC236}">
-                <a16:creationId xmlns:a16="http://schemas.microsoft.com/office/drawing/2014/main" id="{8648E574-64AB-2C41-8ECE-3008A8D9D0F8}"/>
-              </a:ext>
-            </a:extLst>
-          </p:cNvPr>
-          <p:cNvSpPr>
-            <a:spLocks noGrp="1"/>
-          </p:cNvSpPr>
-          <p:nvPr>
-            <p:ph idx="1"/>
-          </p:nvPr>
-        </p:nvSpPr>
-        <p:spPr/>
-        <p:txBody>
-          <a:bodyPr/>
-          <a:lstStyle/>
-          <a:p>
-            <a:r>
-              <a:rPr lang="en-US" dirty="0"/>
-              <a:t>Idioms</a:t>
-            </a:r>
-          </a:p>
-          <a:p>
-            <a:r>
-              <a:rPr lang="en-US" dirty="0"/>
-              <a:t>Design patterns</a:t>
-            </a:r>
-          </a:p>
-          <a:p>
-            <a:r>
-              <a:rPr lang="en-US" dirty="0"/>
-              <a:t>Architectural patterns</a:t>
-            </a:r>
-          </a:p>
-        </p:txBody>
-      </p:sp>
-    </p:spTree>
-    <p:extLst>
-      <p:ext uri="{BB962C8B-B14F-4D97-AF65-F5344CB8AC3E}">
-        <p14:creationId xmlns:p14="http://schemas.microsoft.com/office/powerpoint/2010/main" val="148337173"/>
-      </p:ext>
-    </p:extLst>
-  </p:cSld>
-  <p:clrMapOvr>
-    <a:masterClrMapping/>
-  </p:clrMapOvr>
-</p:sld>
-</file>
-
 <file path=ppt/slides/slide7.xml><?xml version="1.0" encoding="utf-8"?>
 <p:sld xmlns:a="http://schemas.openxmlformats.org/drawingml/2006/main" xmlns:r="http://schemas.openxmlformats.org/officeDocument/2006/relationships" xmlns:p="http://schemas.openxmlformats.org/presentationml/2006/main">
   <p:cSld>
@@ -7442,7 +7690,7 @@
           <p:cNvPr id="2" name="Title 1">
             <a:extLst>
               <a:ext uri="{FF2B5EF4-FFF2-40B4-BE49-F238E27FC236}">
-                <a16:creationId xmlns:a16="http://schemas.microsoft.com/office/drawing/2014/main" id="{F46F8062-0B0D-FB4E-A6FF-F1853A9C8253}"/>
+                <a16:creationId xmlns:a16="http://schemas.microsoft.com/office/drawing/2014/main" id="{691056BE-E16B-CB49-95A2-31D21440DF9D}"/>
               </a:ext>
             </a:extLst>
           </p:cNvPr>
@@ -7460,7 +7708,7 @@
           <a:p>
             <a:r>
               <a:rPr lang="en-US" dirty="0"/>
-              <a:t>Levels of patterns – idioms</a:t>
+              <a:t>Levels of patterns</a:t>
             </a:r>
           </a:p>
         </p:txBody>
@@ -7470,7 +7718,7 @@
           <p:cNvPr id="3" name="Content Placeholder 2">
             <a:extLst>
               <a:ext uri="{FF2B5EF4-FFF2-40B4-BE49-F238E27FC236}">
-                <a16:creationId xmlns:a16="http://schemas.microsoft.com/office/drawing/2014/main" id="{F24F7286-C728-6243-8AC1-70BAB0ABFE61}"/>
+                <a16:creationId xmlns:a16="http://schemas.microsoft.com/office/drawing/2014/main" id="{8648E574-64AB-2C41-8ECE-3008A8D9D0F8}"/>
               </a:ext>
             </a:extLst>
           </p:cNvPr>
@@ -7488,7 +7736,7 @@
           <a:p>
             <a:r>
               <a:rPr lang="en-US" dirty="0"/>
-              <a:t>The expression of a special feature of a recurring construct in one or more programming languages</a:t>
+              <a:t>Idioms</a:t>
             </a:r>
           </a:p>
           <a:p>
@@ -7497,63 +7745,16 @@
           <a:p>
             <a:r>
               <a:rPr lang="en-US" dirty="0"/>
-              <a:t>Often confused with (and mixed with!) coding standards</a:t>
-            </a:r>
-          </a:p>
-        </p:txBody>
-      </p:sp>
-      <p:sp>
-        <p:nvSpPr>
-          <p:cNvPr id="4" name="TextBox 3">
-            <a:extLst>
-              <a:ext uri="{FF2B5EF4-FFF2-40B4-BE49-F238E27FC236}">
-                <a16:creationId xmlns:a16="http://schemas.microsoft.com/office/drawing/2014/main" id="{FA6F0AB8-4538-B749-9404-559123B09F48}"/>
-              </a:ext>
-            </a:extLst>
-          </p:cNvPr>
-          <p:cNvSpPr txBox="1"/>
-          <p:nvPr/>
-        </p:nvSpPr>
-        <p:spPr>
-          <a:xfrm>
-            <a:off x="2352823" y="6011817"/>
-            <a:ext cx="6332183" cy="300082"/>
-          </a:xfrm>
-          <a:prstGeom prst="rect">
-            <a:avLst/>
-          </a:prstGeom>
-          <a:solidFill>
-            <a:schemeClr val="bg1">
-              <a:lumMod val="95000"/>
-            </a:schemeClr>
-          </a:solidFill>
-        </p:spPr>
-        <p:txBody>
-          <a:bodyPr wrap="none" rtlCol="0">
-            <a:spAutoFit/>
-          </a:bodyPr>
-          <a:lstStyle/>
-          <a:p>
-            <a:r>
-              <a:rPr lang="en-US" sz="1350" dirty="0">
-                <a:latin typeface="Courier New" panose="02070309020205020404" pitchFamily="49" charset="0"/>
-                <a:cs typeface="Courier New" panose="02070309020205020404" pitchFamily="49" charset="0"/>
-              </a:rPr>
-              <a:t>string result = value1 ?? value2 ?? value3 ?? </a:t>
-            </a:r>
-            <a:r>
-              <a:rPr lang="en-US" sz="1350" dirty="0" err="1">
-                <a:latin typeface="Courier New" panose="02070309020205020404" pitchFamily="49" charset="0"/>
-                <a:cs typeface="Courier New" panose="02070309020205020404" pitchFamily="49" charset="0"/>
-              </a:rPr>
-              <a:t>String.Empty</a:t>
-            </a:r>
-            <a:r>
-              <a:rPr lang="en-US" sz="1350" dirty="0">
-                <a:latin typeface="Courier New" panose="02070309020205020404" pitchFamily="49" charset="0"/>
-                <a:cs typeface="Courier New" panose="02070309020205020404" pitchFamily="49" charset="0"/>
-              </a:rPr>
-              <a:t>;</a:t>
+              <a:t>Design patterns</a:t>
+            </a:r>
+          </a:p>
+          <a:p>
+            <a:endParaRPr lang="en-US" dirty="0"/>
+          </a:p>
+          <a:p>
+            <a:r>
+              <a:rPr lang="en-US" dirty="0"/>
+              <a:t>Architectural patterns</a:t>
             </a:r>
           </a:p>
         </p:txBody>
@@ -7561,7 +7762,7 @@
     </p:spTree>
     <p:extLst>
       <p:ext uri="{BB962C8B-B14F-4D97-AF65-F5344CB8AC3E}">
-        <p14:creationId xmlns:p14="http://schemas.microsoft.com/office/powerpoint/2010/main" val="4276974717"/>
+        <p14:creationId xmlns:p14="http://schemas.microsoft.com/office/powerpoint/2010/main" val="148337173"/>
       </p:ext>
     </p:extLst>
   </p:cSld>
@@ -7593,7 +7794,7 @@
           <p:cNvPr id="2" name="Title 1">
             <a:extLst>
               <a:ext uri="{FF2B5EF4-FFF2-40B4-BE49-F238E27FC236}">
-                <a16:creationId xmlns:a16="http://schemas.microsoft.com/office/drawing/2014/main" id="{345D324A-D526-C140-B2DB-2A243779101C}"/>
+                <a16:creationId xmlns:a16="http://schemas.microsoft.com/office/drawing/2014/main" id="{F46F8062-0B0D-FB4E-A6FF-F1853A9C8253}"/>
               </a:ext>
             </a:extLst>
           </p:cNvPr>
@@ -7611,7 +7812,7 @@
           <a:p>
             <a:r>
               <a:rPr lang="en-US" dirty="0"/>
-              <a:t>Levels of patterns – design patterns</a:t>
+              <a:t>Levels – idioms</a:t>
             </a:r>
           </a:p>
         </p:txBody>
@@ -7621,7 +7822,7 @@
           <p:cNvPr id="3" name="Content Placeholder 2">
             <a:extLst>
               <a:ext uri="{FF2B5EF4-FFF2-40B4-BE49-F238E27FC236}">
-                <a16:creationId xmlns:a16="http://schemas.microsoft.com/office/drawing/2014/main" id="{C37E202F-6FEF-4C48-8104-4ECDE6CE1222}"/>
+                <a16:creationId xmlns:a16="http://schemas.microsoft.com/office/drawing/2014/main" id="{F24F7286-C728-6243-8AC1-70BAB0ABFE61}"/>
               </a:ext>
             </a:extLst>
           </p:cNvPr>
@@ -7639,7 +7840,7 @@
           <a:p>
             <a:r>
               <a:rPr lang="en-US" dirty="0"/>
-              <a:t>a general, reusable solution to a commonly occurring problem within a given context in software design</a:t>
+              <a:t>The expression of a special feature of a recurring construct in one or more programming languages</a:t>
             </a:r>
           </a:p>
           <a:p>
@@ -7648,11 +7849,8 @@
           <a:p>
             <a:r>
               <a:rPr lang="en-US" dirty="0"/>
-              <a:t>formalized best practices that the programmer can use to solve common problems when designing an application or system</a:t>
-            </a:r>
-          </a:p>
-          <a:p>
-            <a:endParaRPr lang="en-US" dirty="0"/>
+              <a:t>Often confused with (and mixed with!) coding standards</a:t>
+            </a:r>
           </a:p>
         </p:txBody>
       </p:sp>
@@ -7661,7 +7859,7 @@
           <p:cNvPr id="4" name="TextBox 3">
             <a:extLst>
               <a:ext uri="{FF2B5EF4-FFF2-40B4-BE49-F238E27FC236}">
-                <a16:creationId xmlns:a16="http://schemas.microsoft.com/office/drawing/2014/main" id="{0BB5D2F3-BBE1-DF48-B8AA-C6FF5AF55D61}"/>
+                <a16:creationId xmlns:a16="http://schemas.microsoft.com/office/drawing/2014/main" id="{FA6F0AB8-4538-B749-9404-559123B09F48}"/>
               </a:ext>
             </a:extLst>
           </p:cNvPr>
@@ -7670,8 +7868,8 @@
         </p:nvSpPr>
         <p:spPr>
           <a:xfrm>
-            <a:off x="2289323" y="6161858"/>
-            <a:ext cx="6428363" cy="300082"/>
+            <a:off x="2352823" y="6172200"/>
+            <a:ext cx="6332183" cy="300082"/>
           </a:xfrm>
           <a:prstGeom prst="rect">
             <a:avLst/>
@@ -7689,18 +7887,25 @@
           <a:lstStyle/>
           <a:p>
             <a:r>
-              <a:rPr lang="en-US" sz="1350" b="1" dirty="0">
-                <a:latin typeface="Calibri" panose="020F0502020204030204" pitchFamily="34" charset="0"/>
-                <a:cs typeface="Calibri" panose="020F0502020204030204" pitchFamily="34" charset="0"/>
+              <a:rPr lang="en-US" sz="1350" dirty="0">
+                <a:latin typeface="Courier New" panose="02070309020205020404" pitchFamily="49" charset="0"/>
+                <a:cs typeface="Courier New" panose="02070309020205020404" pitchFamily="49" charset="0"/>
               </a:rPr>
-              <a:t>Singleton</a:t>
+              <a:t>string result = value1 ?? value2 ?? value3 ?? </a:t>
+            </a:r>
+            <a:r>
+              <a:rPr lang="en-US" sz="1350" dirty="0" err="1">
+                <a:latin typeface="Courier New" panose="02070309020205020404" pitchFamily="49" charset="0"/>
+                <a:cs typeface="Courier New" panose="02070309020205020404" pitchFamily="49" charset="0"/>
+              </a:rPr>
+              <a:t>String.Empty</a:t>
             </a:r>
             <a:r>
               <a:rPr lang="en-US" sz="1350" dirty="0">
-                <a:latin typeface="Calibri" panose="020F0502020204030204" pitchFamily="34" charset="0"/>
-                <a:cs typeface="Calibri" panose="020F0502020204030204" pitchFamily="34" charset="0"/>
+                <a:latin typeface="Courier New" panose="02070309020205020404" pitchFamily="49" charset="0"/>
+                <a:cs typeface="Courier New" panose="02070309020205020404" pitchFamily="49" charset="0"/>
               </a:rPr>
-              <a:t>: ensure a class has only one instance, and provide a global point of access to it.</a:t>
+              <a:t>;</a:t>
             </a:r>
           </a:p>
         </p:txBody>
@@ -7708,7 +7913,7 @@
     </p:spTree>
     <p:extLst>
       <p:ext uri="{BB962C8B-B14F-4D97-AF65-F5344CB8AC3E}">
-        <p14:creationId xmlns:p14="http://schemas.microsoft.com/office/powerpoint/2010/main" val="27925186"/>
+        <p14:creationId xmlns:p14="http://schemas.microsoft.com/office/powerpoint/2010/main" val="4276974717"/>
       </p:ext>
     </p:extLst>
   </p:cSld>
@@ -7737,10 +7942,10 @@
       </p:grpSpPr>
       <p:sp>
         <p:nvSpPr>
-          <p:cNvPr id="4" name="Title 3">
+          <p:cNvPr id="2" name="Title 1">
             <a:extLst>
               <a:ext uri="{FF2B5EF4-FFF2-40B4-BE49-F238E27FC236}">
-                <a16:creationId xmlns:a16="http://schemas.microsoft.com/office/drawing/2014/main" id="{03FE6122-EFC2-C942-B268-DA20C7759D8B}"/>
+                <a16:creationId xmlns:a16="http://schemas.microsoft.com/office/drawing/2014/main" id="{345D324A-D526-C140-B2DB-2A243779101C}"/>
               </a:ext>
             </a:extLst>
           </p:cNvPr>
@@ -7758,17 +7963,17 @@
           <a:p>
             <a:r>
               <a:rPr lang="en-US" dirty="0"/>
-              <a:t>Architecture</a:t>
-            </a:r>
-          </a:p>
-        </p:txBody>
-      </p:sp>
-      <p:sp>
-        <p:nvSpPr>
-          <p:cNvPr id="5" name="Text Placeholder 4">
+              <a:t>Levels – design patterns</a:t>
+            </a:r>
+          </a:p>
+        </p:txBody>
+      </p:sp>
+      <p:sp>
+        <p:nvSpPr>
+          <p:cNvPr id="3" name="Content Placeholder 2">
             <a:extLst>
               <a:ext uri="{FF2B5EF4-FFF2-40B4-BE49-F238E27FC236}">
-                <a16:creationId xmlns:a16="http://schemas.microsoft.com/office/drawing/2014/main" id="{B4FD8A11-A0F8-7740-8455-15717C062A0D}"/>
+                <a16:creationId xmlns:a16="http://schemas.microsoft.com/office/drawing/2014/main" id="{C37E202F-6FEF-4C48-8104-4ECDE6CE1222}"/>
               </a:ext>
             </a:extLst>
           </p:cNvPr>
@@ -7776,17 +7981,78 @@
             <a:spLocks noGrp="1"/>
           </p:cNvSpPr>
           <p:nvPr>
-            <p:ph type="body" idx="1"/>
-          </p:nvPr>
-        </p:nvSpPr>
-        <p:spPr/>
-        <p:txBody>
-          <a:bodyPr/>
-          <a:lstStyle/>
-          <a:p>
-            <a:r>
-              <a:rPr lang="en-US" dirty="0"/>
-              <a:t>The 60,000 foot view</a:t>
+            <p:ph idx="1"/>
+          </p:nvPr>
+        </p:nvSpPr>
+        <p:spPr/>
+        <p:txBody>
+          <a:bodyPr/>
+          <a:lstStyle/>
+          <a:p>
+            <a:r>
+              <a:rPr lang="en-US" dirty="0"/>
+              <a:t>a general, reusable solution to a commonly occurring problem within a given context in software design</a:t>
+            </a:r>
+          </a:p>
+          <a:p>
+            <a:endParaRPr lang="en-US" dirty="0"/>
+          </a:p>
+          <a:p>
+            <a:r>
+              <a:rPr lang="en-US" dirty="0"/>
+              <a:t>formalized best practices that the programmer can use to solve common problems when designing an application or system</a:t>
+            </a:r>
+          </a:p>
+          <a:p>
+            <a:endParaRPr lang="en-US" dirty="0"/>
+          </a:p>
+        </p:txBody>
+      </p:sp>
+      <p:sp>
+        <p:nvSpPr>
+          <p:cNvPr id="4" name="TextBox 3">
+            <a:extLst>
+              <a:ext uri="{FF2B5EF4-FFF2-40B4-BE49-F238E27FC236}">
+                <a16:creationId xmlns:a16="http://schemas.microsoft.com/office/drawing/2014/main" id="{0BB5D2F3-BBE1-DF48-B8AA-C6FF5AF55D61}"/>
+              </a:ext>
+            </a:extLst>
+          </p:cNvPr>
+          <p:cNvSpPr txBox="1"/>
+          <p:nvPr/>
+        </p:nvSpPr>
+        <p:spPr>
+          <a:xfrm>
+            <a:off x="2289323" y="6172200"/>
+            <a:ext cx="6428363" cy="300082"/>
+          </a:xfrm>
+          <a:prstGeom prst="rect">
+            <a:avLst/>
+          </a:prstGeom>
+          <a:solidFill>
+            <a:schemeClr val="bg1">
+              <a:lumMod val="95000"/>
+            </a:schemeClr>
+          </a:solidFill>
+        </p:spPr>
+        <p:txBody>
+          <a:bodyPr wrap="none" rtlCol="0">
+            <a:spAutoFit/>
+          </a:bodyPr>
+          <a:lstStyle/>
+          <a:p>
+            <a:r>
+              <a:rPr lang="en-US" sz="1350" b="1" dirty="0">
+                <a:latin typeface="Calibri" panose="020F0502020204030204" pitchFamily="34" charset="0"/>
+                <a:cs typeface="Calibri" panose="020F0502020204030204" pitchFamily="34" charset="0"/>
+              </a:rPr>
+              <a:t>Singleton</a:t>
+            </a:r>
+            <a:r>
+              <a:rPr lang="en-US" sz="1350" dirty="0">
+                <a:latin typeface="Calibri" panose="020F0502020204030204" pitchFamily="34" charset="0"/>
+                <a:cs typeface="Calibri" panose="020F0502020204030204" pitchFamily="34" charset="0"/>
+              </a:rPr>
+              <a:t>: ensure a class has only one instance, and provide a global point of access to it.</a:t>
             </a:r>
           </a:p>
         </p:txBody>
@@ -7794,7 +8060,7 @@
     </p:spTree>
     <p:extLst>
       <p:ext uri="{BB962C8B-B14F-4D97-AF65-F5344CB8AC3E}">
-        <p14:creationId xmlns:p14="http://schemas.microsoft.com/office/powerpoint/2010/main" val="4197220091"/>
+        <p14:creationId xmlns:p14="http://schemas.microsoft.com/office/powerpoint/2010/main" val="27925186"/>
       </p:ext>
     </p:extLst>
   </p:cSld>

</xml_diff>